<commit_message>
Mise à jour du plan de présentation et du PPT
</commit_message>
<xml_diff>
--- a/Présentation Python.pptx
+++ b/Présentation Python.pptx
@@ -5,10 +5,10 @@
     <p:sldMasterId id="2147483648" r:id="rId4"/>
   </p:sldMasterIdLst>
   <p:notesMasterIdLst>
-    <p:notesMasterId r:id="rId22"/>
+    <p:notesMasterId r:id="rId23"/>
   </p:notesMasterIdLst>
   <p:handoutMasterIdLst>
-    <p:handoutMasterId r:id="rId23"/>
+    <p:handoutMasterId r:id="rId24"/>
   </p:handoutMasterIdLst>
   <p:sldIdLst>
     <p:sldId id="256" r:id="rId5"/>
@@ -24,10 +24,11 @@
     <p:sldId id="272" r:id="rId15"/>
     <p:sldId id="273" r:id="rId16"/>
     <p:sldId id="277" r:id="rId17"/>
-    <p:sldId id="281" r:id="rId18"/>
-    <p:sldId id="284" r:id="rId19"/>
-    <p:sldId id="296" r:id="rId20"/>
-    <p:sldId id="267" r:id="rId21"/>
+    <p:sldId id="297" r:id="rId18"/>
+    <p:sldId id="281" r:id="rId19"/>
+    <p:sldId id="284" r:id="rId20"/>
+    <p:sldId id="296" r:id="rId21"/>
+    <p:sldId id="267" r:id="rId22"/>
   </p:sldIdLst>
   <p:sldSz cx="12192000" cy="6858000"/>
   <p:notesSz cx="6858000" cy="9144000"/>
@@ -244,7 +245,7 @@
             <a:pPr rtl="0"/>
             <a:fld id="{AB6668A0-F58D-414D-AE91-080F13B20938}" type="datetime1">
               <a:rPr lang="fr-CA" smtClean="0"/>
-              <a:t>2023-05-07</a:t>
+              <a:t>2023-05-08</a:t>
             </a:fld>
             <a:endParaRPr lang="fr-CA"/>
           </a:p>
@@ -426,7 +427,7 @@
             <a:pPr rtl="0"/>
             <a:fld id="{F26646BE-8F4D-433F-8E37-8867BEC0AD1D}" type="datetime1">
               <a:rPr lang="fr-CA" noProof="0" smtClean="0"/>
-              <a:t>2023-05-07</a:t>
+              <a:t>2023-05-08</a:t>
             </a:fld>
             <a:endParaRPr lang="fr-CA" noProof="0"/>
           </a:p>
@@ -850,7 +851,7 @@
             <a:pPr rtl="0"/>
             <a:fld id="{EE000EEB-8338-48D7-8EE8-EE0082EF7602}" type="slidenum">
               <a:rPr lang="fr-CA" smtClean="0"/>
-              <a:t>17</a:t>
+              <a:t>18</a:t>
             </a:fld>
             <a:endParaRPr lang="fr-CA"/>
           </a:p>
@@ -1055,7 +1056,7 @@
             <a:pPr rtl="0"/>
             <a:fld id="{22B980AB-746C-45BA-88C2-AEB09BE6567D}" type="datetime1">
               <a:rPr lang="fr-CA" noProof="0" smtClean="0"/>
-              <a:t>2023-05-07</a:t>
+              <a:t>2023-05-08</a:t>
             </a:fld>
             <a:endParaRPr lang="fr-CA" noProof="0"/>
           </a:p>
@@ -1329,7 +1330,7 @@
             <a:pPr rtl="0"/>
             <a:fld id="{C4AF0A8B-8F95-431E-B747-EAC700012099}" type="datetime1">
               <a:rPr lang="fr-CA" noProof="0" smtClean="0"/>
-              <a:t>2023-05-07</a:t>
+              <a:t>2023-05-08</a:t>
             </a:fld>
             <a:endParaRPr lang="fr-CA" noProof="0"/>
           </a:p>
@@ -1522,7 +1523,7 @@
             <a:pPr rtl="0"/>
             <a:fld id="{7E47EABE-C646-4463-BD1D-3BE88FD78DE4}" type="datetime1">
               <a:rPr lang="fr-CA" noProof="0" smtClean="0"/>
-              <a:t>2023-05-07</a:t>
+              <a:t>2023-05-08</a:t>
             </a:fld>
             <a:endParaRPr lang="fr-CA" noProof="0"/>
           </a:p>
@@ -1789,7 +1790,7 @@
             <a:pPr rtl="0"/>
             <a:fld id="{F4FE871D-9D12-4A9F-8391-4599A82FA4E1}" type="datetime1">
               <a:rPr lang="fr-CA" noProof="0" smtClean="0"/>
-              <a:t>2023-05-07</a:t>
+              <a:t>2023-05-08</a:t>
             </a:fld>
             <a:endParaRPr lang="fr-CA" noProof="0"/>
           </a:p>
@@ -2120,7 +2121,7 @@
             <a:pPr rtl="0"/>
             <a:fld id="{E4728C79-8334-4362-A40F-B13C3AD662B3}" type="datetime1">
               <a:rPr lang="fr-CA" noProof="0" smtClean="0"/>
-              <a:t>2023-05-07</a:t>
+              <a:t>2023-05-08</a:t>
             </a:fld>
             <a:endParaRPr lang="fr-CA" noProof="0"/>
           </a:p>
@@ -2729,7 +2730,7 @@
             <a:pPr rtl="0"/>
             <a:fld id="{3760A96E-7419-4DC9-ACC1-457194A0BF5A}" type="datetime1">
               <a:rPr lang="fr-CA" noProof="0" smtClean="0"/>
-              <a:t>2023-05-07</a:t>
+              <a:t>2023-05-08</a:t>
             </a:fld>
             <a:endParaRPr lang="fr-CA" noProof="0"/>
           </a:p>
@@ -3575,7 +3576,7 @@
             <a:pPr rtl="0"/>
             <a:fld id="{9DDBA650-E13C-46BA-9E81-D7951B6F7C8F}" type="datetime1">
               <a:rPr lang="fr-CA" noProof="0" smtClean="0"/>
-              <a:t>2023-05-07</a:t>
+              <a:t>2023-05-08</a:t>
             </a:fld>
             <a:endParaRPr lang="fr-CA" noProof="0"/>
           </a:p>
@@ -3743,7 +3744,7 @@
             <a:pPr rtl="0"/>
             <a:fld id="{636CB366-30DD-47D9-BAE9-C2CE05E36DDE}" type="datetime1">
               <a:rPr lang="fr-CA" noProof="0" smtClean="0"/>
-              <a:t>2023-05-07</a:t>
+              <a:t>2023-05-08</a:t>
             </a:fld>
             <a:endParaRPr lang="fr-CA" noProof="0"/>
           </a:p>
@@ -3921,7 +3922,7 @@
             <a:pPr rtl="0"/>
             <a:fld id="{9D36D925-BA7A-4BB4-9E76-575AE5BC3B88}" type="datetime1">
               <a:rPr lang="fr-CA" noProof="0" smtClean="0"/>
-              <a:t>2023-05-07</a:t>
+              <a:t>2023-05-08</a:t>
             </a:fld>
             <a:endParaRPr lang="fr-CA" noProof="0"/>
           </a:p>
@@ -4089,7 +4090,7 @@
             <a:pPr rtl="0"/>
             <a:fld id="{B661899C-B772-4425-9A25-7323E057CD4F}" type="datetime1">
               <a:rPr lang="fr-CA" noProof="0" smtClean="0"/>
-              <a:t>2023-05-07</a:t>
+              <a:t>2023-05-08</a:t>
             </a:fld>
             <a:endParaRPr lang="fr-CA" noProof="0"/>
           </a:p>
@@ -4332,7 +4333,7 @@
             <a:pPr rtl="0"/>
             <a:fld id="{CA2EB567-1910-44B6-9583-AA7295650C9F}" type="datetime1">
               <a:rPr lang="fr-CA" noProof="0" smtClean="0"/>
-              <a:t>2023-05-07</a:t>
+              <a:t>2023-05-08</a:t>
             </a:fld>
             <a:endParaRPr lang="fr-CA" noProof="0"/>
           </a:p>
@@ -4621,7 +4622,7 @@
             <a:pPr rtl="0"/>
             <a:fld id="{E2A09355-6301-4C75-A7C1-066F8B35CC33}" type="datetime1">
               <a:rPr lang="fr-CA" noProof="0" smtClean="0"/>
-              <a:t>2023-05-07</a:t>
+              <a:t>2023-05-08</a:t>
             </a:fld>
             <a:endParaRPr lang="fr-CA" noProof="0"/>
           </a:p>
@@ -5056,7 +5057,7 @@
             <a:pPr rtl="0"/>
             <a:fld id="{A6968EE5-D8B6-4962-A3CB-3B875D0DC086}" type="datetime1">
               <a:rPr lang="fr-CA" noProof="0" smtClean="0"/>
-              <a:t>2023-05-07</a:t>
+              <a:t>2023-05-08</a:t>
             </a:fld>
             <a:endParaRPr lang="fr-CA" noProof="0"/>
           </a:p>
@@ -5173,7 +5174,7 @@
             <a:pPr rtl="0"/>
             <a:fld id="{ED3E2041-39F1-407B-8F27-B1AD4AAB3662}" type="datetime1">
               <a:rPr lang="fr-CA" noProof="0" smtClean="0"/>
-              <a:t>2023-05-07</a:t>
+              <a:t>2023-05-08</a:t>
             </a:fld>
             <a:endParaRPr lang="fr-CA" noProof="0"/>
           </a:p>
@@ -5266,7 +5267,7 @@
             <a:pPr rtl="0"/>
             <a:fld id="{EA2E2A80-2DE7-458D-A160-E32CE03B4829}" type="datetime1">
               <a:rPr lang="fr-CA" noProof="0" smtClean="0"/>
-              <a:t>2023-05-07</a:t>
+              <a:t>2023-05-08</a:t>
             </a:fld>
             <a:endParaRPr lang="fr-CA" noProof="0"/>
           </a:p>
@@ -5543,7 +5544,7 @@
             <a:pPr rtl="0"/>
             <a:fld id="{4F0B7DB0-C955-4F94-8EC4-2CC64A3E549C}" type="datetime1">
               <a:rPr lang="fr-CA" noProof="0" smtClean="0"/>
-              <a:t>2023-05-07</a:t>
+              <a:t>2023-05-08</a:t>
             </a:fld>
             <a:endParaRPr lang="fr-CA" noProof="0"/>
           </a:p>
@@ -5817,7 +5818,7 @@
             <a:pPr rtl="0"/>
             <a:fld id="{7A24FBEF-8C6D-4424-803F-7CDF60EB21CE}" type="datetime1">
               <a:rPr lang="fr-CA" noProof="0" smtClean="0"/>
-              <a:t>2023-05-07</a:t>
+              <a:t>2023-05-08</a:t>
             </a:fld>
             <a:endParaRPr lang="fr-CA" noProof="0"/>
           </a:p>
@@ -6243,7 +6244,7 @@
             <a:pPr rtl="0"/>
             <a:fld id="{60B728C0-8DF7-4BDD-B8CD-12FF7C2A3ABA}" type="datetime1">
               <a:rPr lang="fr-CA" noProof="1" smtClean="0"/>
-              <a:t>2023-05-07</a:t>
+              <a:t>2023-05-08</a:t>
             </a:fld>
             <a:endParaRPr lang="fr-CA" noProof="1"/>
           </a:p>
@@ -8201,6 +8202,275 @@
           <p:cNvPr id="2" name="Title 1">
             <a:extLst>
               <a:ext uri="{FF2B5EF4-FFF2-40B4-BE49-F238E27FC236}">
+                <a16:creationId xmlns:a16="http://schemas.microsoft.com/office/drawing/2014/main" id="{A71CD50E-0925-2940-94FF-41BBA03442F7}"/>
+              </a:ext>
+            </a:extLst>
+          </p:cNvPr>
+          <p:cNvSpPr>
+            <a:spLocks noGrp="1"/>
+          </p:cNvSpPr>
+          <p:nvPr>
+            <p:ph type="title"/>
+          </p:nvPr>
+        </p:nvSpPr>
+        <p:spPr/>
+        <p:txBody>
+          <a:bodyPr/>
+          <a:lstStyle/>
+          <a:p>
+            <a:r>
+              <a:rPr lang="fr-CA" dirty="0"/>
+              <a:t>Présentation de l’application boursière</a:t>
+            </a:r>
+          </a:p>
+        </p:txBody>
+      </p:sp>
+      <p:sp>
+        <p:nvSpPr>
+          <p:cNvPr id="3" name="Content Placeholder 2">
+            <a:extLst>
+              <a:ext uri="{FF2B5EF4-FFF2-40B4-BE49-F238E27FC236}">
+                <a16:creationId xmlns:a16="http://schemas.microsoft.com/office/drawing/2014/main" id="{1AFDCB7F-C0BD-63F9-E73C-BA72EBA695B3}"/>
+              </a:ext>
+            </a:extLst>
+          </p:cNvPr>
+          <p:cNvSpPr>
+            <a:spLocks noGrp="1"/>
+          </p:cNvSpPr>
+          <p:nvPr>
+            <p:ph idx="1"/>
+          </p:nvPr>
+        </p:nvSpPr>
+        <p:spPr/>
+        <p:txBody>
+          <a:bodyPr/>
+          <a:lstStyle/>
+          <a:p>
+            <a:r>
+              <a:rPr lang="fr-CA" dirty="0"/>
+              <a:t>API</a:t>
+            </a:r>
+          </a:p>
+          <a:p>
+            <a:r>
+              <a:rPr lang="fr-CA" dirty="0"/>
+              <a:t>La configuration</a:t>
+            </a:r>
+          </a:p>
+          <a:p>
+            <a:r>
+              <a:rPr lang="fr-CA" dirty="0"/>
+              <a:t>Prise de données de l’API</a:t>
+            </a:r>
+          </a:p>
+          <a:p>
+            <a:r>
+              <a:rPr lang="fr-CA" dirty="0"/>
+              <a:t>Gestion des données</a:t>
+            </a:r>
+          </a:p>
+          <a:p>
+            <a:r>
+              <a:rPr lang="fr-CA" dirty="0"/>
+              <a:t>Traitement des données</a:t>
+            </a:r>
+          </a:p>
+          <a:p>
+            <a:r>
+              <a:rPr lang="fr-CA" dirty="0"/>
+              <a:t>Affichage via </a:t>
+            </a:r>
+            <a:r>
+              <a:rPr lang="fr-CA" dirty="0" err="1"/>
+              <a:t>Matplotlib</a:t>
+            </a:r>
+            <a:endParaRPr lang="fr-CA" dirty="0"/>
+          </a:p>
+          <a:p>
+            <a:r>
+              <a:rPr lang="fr-CA" dirty="0"/>
+              <a:t>Affichage via </a:t>
+            </a:r>
+            <a:r>
+              <a:rPr lang="fr-CA" dirty="0" err="1"/>
+              <a:t>Streamlit</a:t>
+            </a:r>
+            <a:endParaRPr lang="fr-CA" dirty="0"/>
+          </a:p>
+        </p:txBody>
+      </p:sp>
+      <p:pic>
+        <p:nvPicPr>
+          <p:cNvPr id="4" name="Picture 3" descr="Icon&#10;&#10;Description automatically generated">
+            <a:extLst>
+              <a:ext uri="{FF2B5EF4-FFF2-40B4-BE49-F238E27FC236}">
+                <a16:creationId xmlns:a16="http://schemas.microsoft.com/office/drawing/2014/main" id="{7A103526-4814-D43F-B50B-2FFDC31FED2C}"/>
+              </a:ext>
+            </a:extLst>
+          </p:cNvPr>
+          <p:cNvPicPr>
+            <a:picLocks noChangeAspect="1"/>
+          </p:cNvPicPr>
+          <p:nvPr/>
+        </p:nvPicPr>
+        <p:blipFill>
+          <a:blip r:embed="rId2">
+            <a:extLst>
+              <a:ext uri="{BEBA8EAE-BF5A-486C-A8C5-ECC9F3942E4B}">
+                <a14:imgProps xmlns:a14="http://schemas.microsoft.com/office/drawing/2010/main">
+                  <a14:imgLayer r:embed="rId3">
+                    <a14:imgEffect>
+                      <a14:backgroundRemoval t="0" b="98889" l="0" r="95833">
+                        <a14:foregroundMark x1="45839" y1="21123" x2="65864" y2="34817"/>
+                        <a14:foregroundMark x1="37451" y1="15387" x2="38997" y2="16444"/>
+                        <a14:foregroundMark x1="65773" y1="33981" x2="65556" y2="38056"/>
+                        <a14:foregroundMark x1="66672" y1="17060" x2="66005" y2="29601"/>
+                        <a14:foregroundMark x1="65970" y1="35791" x2="48219" y2="46292"/>
+                        <a14:foregroundMark x1="43975" y1="34426" x2="11944" y2="52500"/>
+                        <a14:foregroundMark x1="11944" y1="52500" x2="26713" y2="65767"/>
+                        <a14:foregroundMark x1="45981" y1="54263" x2="37423" y2="59567"/>
+                        <a14:foregroundMark x1="63414" y1="43459" x2="55659" y2="48265"/>
+                        <a14:foregroundMark x1="64146" y1="45021" x2="62830" y2="46337"/>
+                        <a14:foregroundMark x1="64840" y1="41320" x2="47508" y2="46292"/>
+                        <a14:foregroundMark x1="65029" y1="50884" x2="63333" y2="55278"/>
+                        <a14:foregroundMark x1="61522" y1="86384" x2="67510" y2="80163"/>
+                        <a14:foregroundMark x1="52500" y1="36111" x2="49722" y2="31944"/>
+                        <a14:foregroundMark x1="55556" y1="33056" x2="43056" y2="32778"/>
+                        <a14:foregroundMark x1="41944" y1="15833" x2="46389" y2="20833"/>
+                        <a14:foregroundMark x1="43611" y1="11944" x2="59167" y2="12500"/>
+                        <a14:foregroundMark x1="67222" y1="18889" x2="67469" y2="38855"/>
+                        <a14:foregroundMark x1="38611" y1="47500" x2="29167" y2="52778"/>
+                        <a14:foregroundMark x1="33133" y1="56389" x2="33611" y2="70278"/>
+                        <a14:foregroundMark x1="33105" y1="55556" x2="33133" y2="56389"/>
+                        <a14:foregroundMark x1="33094" y1="55248" x2="33105" y2="55556"/>
+                        <a14:foregroundMark x1="36667" y1="67778" x2="38611" y2="63333"/>
+                        <a14:foregroundMark x1="38611" y1="65278" x2="57500" y2="55000"/>
+                        <a14:foregroundMark x1="39722" y1="61667" x2="36389" y2="67500"/>
+                        <a14:foregroundMark x1="55833" y1="73056" x2="63889" y2="75000"/>
+                        <a14:foregroundMark x1="46667" y1="68056" x2="50618" y2="69444"/>
+                        <a14:foregroundMark x1="53333" y1="53056" x2="67500" y2="52222"/>
+                        <a14:foregroundMark x1="71074" y1="40975" x2="71111" y2="40556"/>
+                        <a14:foregroundMark x1="70278" y1="50000" x2="70393" y2="48694"/>
+                        <a14:foregroundMark x1="72222" y1="41111" x2="71944" y2="40278"/>
+                        <a14:foregroundMark x1="72445" y1="41781" x2="72222" y2="41111"/>
+                        <a14:foregroundMark x1="74444" y1="47778" x2="73587" y2="45206"/>
+                        <a14:foregroundMark x1="68156" y1="47379" x2="67222" y2="48611"/>
+                        <a14:foregroundMark x1="72904" y1="41111" x2="72411" y2="41761"/>
+                        <a14:foregroundMark x1="74167" y1="39444" x2="72904" y2="41111"/>
+                        <a14:foregroundMark x1="72778" y1="31944" x2="80000" y2="33333"/>
+                        <a14:foregroundMark x1="33333" y1="55000" x2="33333" y2="55000"/>
+                        <a14:foregroundMark x1="33333" y1="55556" x2="33333" y2="55556"/>
+                        <a14:foregroundMark x1="33889" y1="55556" x2="32785" y2="55924"/>
+                        <a14:foregroundMark x1="50278" y1="69167" x2="51471" y2="69316"/>
+                        <a14:backgroundMark x1="13611" y1="8056" x2="15000" y2="12500"/>
+                        <a14:backgroundMark x1="20833" y1="8333" x2="15833" y2="24444"/>
+                        <a14:backgroundMark x1="26111" y1="8889" x2="25278" y2="26389"/>
+                        <a14:backgroundMark x1="20556" y1="1667" x2="83333" y2="1111"/>
+                        <a14:backgroundMark x1="83333" y1="1111" x2="98056" y2="1667"/>
+                        <a14:backgroundMark x1="96667" y1="5000" x2="9167" y2="5278"/>
+                        <a14:backgroundMark x1="278" y1="833" x2="1111" y2="48333"/>
+                        <a14:backgroundMark x1="1111" y1="48333" x2="1667" y2="49722"/>
+                        <a14:backgroundMark x1="556" y1="833" x2="16389" y2="14444"/>
+                        <a14:backgroundMark x1="10000" y1="10000" x2="3333" y2="16667"/>
+                        <a14:backgroundMark x1="33611" y1="11389" x2="33611" y2="11389"/>
+                        <a14:backgroundMark x1="39167" y1="10000" x2="39167" y2="10000"/>
+                        <a14:backgroundMark x1="33889" y1="9444" x2="29167" y2="11111"/>
+                        <a14:backgroundMark x1="40556" y1="8889" x2="29444" y2="14167"/>
+                        <a14:backgroundMark x1="35833" y1="9722" x2="30278" y2="16111"/>
+                        <a14:backgroundMark x1="30278" y1="16667" x2="29722" y2="26944"/>
+                        <a14:backgroundMark x1="21389" y1="29722" x2="41510" y2="30314"/>
+                        <a14:backgroundMark x1="28611" y1="15000" x2="31389" y2="18611"/>
+                        <a14:backgroundMark x1="278" y1="28889" x2="2500" y2="99444"/>
+                        <a14:backgroundMark x1="10000" y1="99722" x2="53056" y2="98611"/>
+                        <a14:backgroundMark x1="69444" y1="95278" x2="49444" y2="97222"/>
+                        <a14:backgroundMark x1="66667" y1="91389" x2="48889" y2="93056"/>
+                        <a14:backgroundMark x1="63056" y1="88056" x2="56667" y2="91389"/>
+                        <a14:backgroundMark x1="69722" y1="73333" x2="73889" y2="83056"/>
+                        <a14:backgroundMark x1="63056" y1="77500" x2="63056" y2="79167"/>
+                        <a14:backgroundMark x1="60183" y1="78569" x2="60000" y2="78889"/>
+                        <a14:backgroundMark x1="82500" y1="70000" x2="60884" y2="69810"/>
+                        <a14:backgroundMark x1="64029" y1="48545" x2="65574" y2="47542"/>
+                        <a14:backgroundMark x1="68678" y1="18871" x2="68889" y2="12500"/>
+                        <a14:backgroundMark x1="55038" y1="50278" x2="41229" y2="50278"/>
+                        <a14:backgroundMark x1="30687" y1="70379" x2="30556" y2="71111"/>
+                        <a14:backgroundMark x1="69722" y1="10000" x2="74718" y2="29266"/>
+                        <a14:backgroundMark x1="82565" y1="29791" x2="92778" y2="40556"/>
+                        <a14:backgroundMark x1="72222" y1="18889" x2="82189" y2="29395"/>
+                        <a14:backgroundMark x1="89444" y1="35278" x2="92222" y2="68889"/>
+                        <a14:backgroundMark x1="95556" y1="41667" x2="98056" y2="92222"/>
+                        <a14:backgroundMark x1="98333" y1="80000" x2="98056" y2="98056"/>
+                        <a14:backgroundMark x1="96944" y1="90833" x2="64444" y2="95278"/>
+                        <a14:backgroundMark x1="44390" y1="10748" x2="33611" y2="10556"/>
+                        <a14:backgroundMark x1="64722" y1="11111" x2="60125" y2="11029"/>
+                        <a14:backgroundMark x1="59830" y1="11482" x2="75833" y2="13889"/>
+                        <a14:backgroundMark x1="44444" y1="9167" x2="45333" y2="9301"/>
+                        <a14:backgroundMark x1="37500" y1="20000" x2="39569" y2="20239"/>
+                        <a14:backgroundMark x1="55272" y1="49896" x2="47778" y2="50833"/>
+                        <a14:backgroundMark x1="70278" y1="41111" x2="70278" y2="41111"/>
+                        <a14:backgroundMark x1="70833" y1="40833" x2="66944" y2="46667"/>
+                        <a14:backgroundMark x1="56111" y1="70000" x2="51944" y2="70556"/>
+                        <a14:backgroundMark x1="32778" y1="55000" x2="32778" y2="55000"/>
+                        <a14:backgroundMark x1="32222" y1="56389" x2="32222" y2="56389"/>
+                        <a14:backgroundMark x1="31389" y1="56111" x2="33333" y2="54722"/>
+                        <a14:backgroundMark x1="32500" y1="55556" x2="32500" y2="55556"/>
+                        <a14:backgroundMark x1="51111" y1="69444" x2="51111" y2="69444"/>
+                        <a14:backgroundMark x1="51389" y1="69444" x2="52778" y2="69444"/>
+                      </a14:backgroundRemoval>
+                    </a14:imgEffect>
+                  </a14:imgLayer>
+                </a14:imgProps>
+              </a:ext>
+            </a:extLst>
+          </a:blip>
+          <a:stretch>
+            <a:fillRect/>
+          </a:stretch>
+        </p:blipFill>
+        <p:spPr>
+          <a:xfrm>
+            <a:off x="11086306" y="0"/>
+            <a:ext cx="1143000" cy="1143000"/>
+          </a:xfrm>
+          <a:prstGeom prst="rect">
+            <a:avLst/>
+          </a:prstGeom>
+        </p:spPr>
+      </p:pic>
+    </p:spTree>
+    <p:extLst>
+      <p:ext uri="{BB962C8B-B14F-4D97-AF65-F5344CB8AC3E}">
+        <p14:creationId xmlns:p14="http://schemas.microsoft.com/office/powerpoint/2010/main" val="3215618204"/>
+      </p:ext>
+    </p:extLst>
+  </p:cSld>
+  <p:clrMapOvr>
+    <a:masterClrMapping/>
+  </p:clrMapOvr>
+</p:sld>
+</file>
+
+<file path=ppt/slides/slide15.xml><?xml version="1.0" encoding="utf-8"?>
+<p:sld xmlns:a="http://schemas.openxmlformats.org/drawingml/2006/main" xmlns:r="http://schemas.openxmlformats.org/officeDocument/2006/relationships" xmlns:p="http://schemas.openxmlformats.org/presentationml/2006/main">
+  <p:cSld>
+    <p:spTree>
+      <p:nvGrpSpPr>
+        <p:cNvPr id="1" name=""/>
+        <p:cNvGrpSpPr/>
+        <p:nvPr/>
+      </p:nvGrpSpPr>
+      <p:grpSpPr>
+        <a:xfrm>
+          <a:off x="0" y="0"/>
+          <a:ext cx="0" cy="0"/>
+          <a:chOff x="0" y="0"/>
+          <a:chExt cx="0" cy="0"/>
+        </a:xfrm>
+      </p:grpSpPr>
+      <p:sp>
+        <p:nvSpPr>
+          <p:cNvPr id="2" name="Title 1">
+            <a:extLst>
+              <a:ext uri="{FF2B5EF4-FFF2-40B4-BE49-F238E27FC236}">
                 <a16:creationId xmlns:a16="http://schemas.microsoft.com/office/drawing/2014/main" id="{7951E741-4010-7C3E-678A-A6E032B4022E}"/>
               </a:ext>
             </a:extLst>
@@ -8448,7 +8718,7 @@
 </p:sld>
 </file>
 
-<file path=ppt/slides/slide15.xml><?xml version="1.0" encoding="utf-8"?>
+<file path=ppt/slides/slide16.xml><?xml version="1.0" encoding="utf-8"?>
 <p:sld xmlns:a="http://schemas.openxmlformats.org/drawingml/2006/main" xmlns:r="http://schemas.openxmlformats.org/officeDocument/2006/relationships" xmlns:p="http://schemas.openxmlformats.org/presentationml/2006/main">
   <p:cSld>
     <p:spTree>
@@ -8721,7 +8991,7 @@
 </p:sld>
 </file>
 
-<file path=ppt/slides/slide16.xml><?xml version="1.0" encoding="utf-8"?>
+<file path=ppt/slides/slide17.xml><?xml version="1.0" encoding="utf-8"?>
 <p:sld xmlns:a="http://schemas.openxmlformats.org/drawingml/2006/main" xmlns:r="http://schemas.openxmlformats.org/officeDocument/2006/relationships" xmlns:p="http://schemas.openxmlformats.org/presentationml/2006/main">
   <p:cSld>
     <p:spTree>
@@ -8923,7 +9193,7 @@
 </p:sld>
 </file>
 
-<file path=ppt/slides/slide17.xml><?xml version="1.0" encoding="utf-8"?>
+<file path=ppt/slides/slide18.xml><?xml version="1.0" encoding="utf-8"?>
 <p:sld xmlns:a="http://schemas.openxmlformats.org/drawingml/2006/main" xmlns:r="http://schemas.openxmlformats.org/officeDocument/2006/relationships" xmlns:p="http://schemas.openxmlformats.org/presentationml/2006/main">
   <p:cSld>
     <p:bg>
@@ -12051,24 +12321,6 @@
 </file>
 
 <file path=customXml/item1.xml><?xml version="1.0" encoding="utf-8"?>
-<?mso-contentType ?>
-<FormTemplates xmlns="http://schemas.microsoft.com/sharepoint/v3/contenttype/forms">
-  <Display>DocumentLibraryForm</Display>
-  <Edit>DocumentLibraryForm</Edit>
-  <New>DocumentLibraryForm</New>
-</FormTemplates>
-</file>
-
-<file path=customXml/item2.xml><?xml version="1.0" encoding="utf-8"?>
-<p:properties xmlns:p="http://schemas.microsoft.com/office/2006/metadata/properties" xmlns:xsi="http://www.w3.org/2001/XMLSchema-instance" xmlns:pc="http://schemas.microsoft.com/office/infopath/2007/PartnerControls">
-  <documentManagement>
-    <Status xmlns="71af3243-3dd4-4a8d-8c0d-dd76da1f02a5">Not started</Status>
-    <MediaServiceKeyPoints xmlns="71af3243-3dd4-4a8d-8c0d-dd76da1f02a5" xsi:nil="true"/>
-  </documentManagement>
-</p:properties>
-</file>
-
-<file path=customXml/item3.xml><?xml version="1.0" encoding="utf-8"?>
 <ct:contentTypeSchema xmlns:ct="http://schemas.microsoft.com/office/2006/metadata/contentType" xmlns:ma="http://schemas.microsoft.com/office/2006/metadata/properties/metaAttributes" ct:_="" ma:_="" ma:contentTypeName="Document" ma:contentTypeID="0x01010079F111ED35F8CC479449609E8A0923A6" ma:contentTypeVersion="12" ma:contentTypeDescription="Create a new document." ma:contentTypeScope="" ma:versionID="93813dd7ca6ad654711aa0ab317e03a3">
   <xsd:schema xmlns:xsd="http://www.w3.org/2001/XMLSchema" xmlns:xs="http://www.w3.org/2001/XMLSchema" xmlns:p="http://schemas.microsoft.com/office/2006/metadata/properties" xmlns:ns2="71af3243-3dd4-4a8d-8c0d-dd76da1f02a5" xmlns:ns3="16c05727-aa75-4e4a-9b5f-8a80a1165891" targetNamespace="http://schemas.microsoft.com/office/2006/metadata/properties" ma:root="true" ma:fieldsID="f11dc0ce689dd3925e84e4e35398c6e7" ns2:_="" ns3:_="">
     <xsd:import namespace="71af3243-3dd4-4a8d-8c0d-dd76da1f02a5"/>
@@ -12289,25 +12541,25 @@
 </ct:contentTypeSchema>
 </file>
 
-<file path=customXml/itemProps1.xml><?xml version="1.0" encoding="utf-8"?>
-<ds:datastoreItem xmlns:ds="http://schemas.openxmlformats.org/officeDocument/2006/customXml" ds:itemID="{0D16958A-754B-4396-9457-FD7A427A37DD}">
-  <ds:schemaRefs>
-    <ds:schemaRef ds:uri="http://schemas.microsoft.com/sharepoint/v3/contenttype/forms"/>
-  </ds:schemaRefs>
-</ds:datastoreItem>
+<file path=customXml/item2.xml><?xml version="1.0" encoding="utf-8"?>
+<p:properties xmlns:p="http://schemas.microsoft.com/office/2006/metadata/properties" xmlns:xsi="http://www.w3.org/2001/XMLSchema-instance" xmlns:pc="http://schemas.microsoft.com/office/infopath/2007/PartnerControls">
+  <documentManagement>
+    <Status xmlns="71af3243-3dd4-4a8d-8c0d-dd76da1f02a5">Not started</Status>
+    <MediaServiceKeyPoints xmlns="71af3243-3dd4-4a8d-8c0d-dd76da1f02a5" xsi:nil="true"/>
+  </documentManagement>
+</p:properties>
 </file>
 
-<file path=customXml/itemProps2.xml><?xml version="1.0" encoding="utf-8"?>
-<ds:datastoreItem xmlns:ds="http://schemas.openxmlformats.org/officeDocument/2006/customXml" ds:itemID="{048C88F1-1664-415F-AFCE-F6CF45809817}">
-  <ds:schemaRefs>
-    <ds:schemaRef ds:uri="http://schemas.microsoft.com/office/2006/metadata/properties"/>
-    <ds:schemaRef ds:uri="http://schemas.microsoft.com/office/infopath/2007/PartnerControls"/>
-    <ds:schemaRef ds:uri="71af3243-3dd4-4a8d-8c0d-dd76da1f02a5"/>
-  </ds:schemaRefs>
-</ds:datastoreItem>
+<file path=customXml/item3.xml><?xml version="1.0" encoding="utf-8"?>
+<?mso-contentType ?>
+<FormTemplates xmlns="http://schemas.microsoft.com/sharepoint/v3/contenttype/forms">
+  <Display>DocumentLibraryForm</Display>
+  <Edit>DocumentLibraryForm</Edit>
+  <New>DocumentLibraryForm</New>
+</FormTemplates>
 </file>
 
-<file path=customXml/itemProps3.xml><?xml version="1.0" encoding="utf-8"?>
+<file path=customXml/itemProps1.xml><?xml version="1.0" encoding="utf-8"?>
 <ds:datastoreItem xmlns:ds="http://schemas.openxmlformats.org/officeDocument/2006/customXml" ds:itemID="{CC30393A-FEC6-4A44-9E4A-6EA49F1F7DC0}">
   <ds:schemaRefs>
     <ds:schemaRef ds:uri="http://schemas.microsoft.com/office/2006/metadata/contentType"/>
@@ -12324,4 +12576,22 @@
     <ds:schemaRef ds:uri="http://schemas.microsoft.com/internal/obd"/>
   </ds:schemaRefs>
 </ds:datastoreItem>
+</file>
+
+<file path=customXml/itemProps2.xml><?xml version="1.0" encoding="utf-8"?>
+<ds:datastoreItem xmlns:ds="http://schemas.openxmlformats.org/officeDocument/2006/customXml" ds:itemID="{048C88F1-1664-415F-AFCE-F6CF45809817}">
+  <ds:schemaRefs>
+    <ds:schemaRef ds:uri="http://schemas.microsoft.com/office/2006/metadata/properties"/>
+    <ds:schemaRef ds:uri="http://schemas.microsoft.com/office/infopath/2007/PartnerControls"/>
+    <ds:schemaRef ds:uri="71af3243-3dd4-4a8d-8c0d-dd76da1f02a5"/>
+  </ds:schemaRefs>
+</ds:datastoreItem>
+</file>
+
+<file path=customXml/itemProps3.xml><?xml version="1.0" encoding="utf-8"?>
+<ds:datastoreItem xmlns:ds="http://schemas.openxmlformats.org/officeDocument/2006/customXml" ds:itemID="{0D16958A-754B-4396-9457-FD7A427A37DD}">
+  <ds:schemaRefs>
+    <ds:schemaRef ds:uri="http://schemas.microsoft.com/sharepoint/v3/contenttype/forms"/>
+  </ds:schemaRefs>
+</ds:datastoreItem>
 </file>
</xml_diff>

<commit_message>
Terminé le PPT de présentation
</commit_message>
<xml_diff>
--- a/Présentation Python.pptx
+++ b/Présentation Python.pptx
@@ -5,30 +5,28 @@
     <p:sldMasterId id="2147483648" r:id="rId4"/>
   </p:sldMasterIdLst>
   <p:notesMasterIdLst>
-    <p:notesMasterId r:id="rId23"/>
+    <p:notesMasterId r:id="rId21"/>
   </p:notesMasterIdLst>
   <p:handoutMasterIdLst>
-    <p:handoutMasterId r:id="rId24"/>
+    <p:handoutMasterId r:id="rId22"/>
   </p:handoutMasterIdLst>
   <p:sldIdLst>
     <p:sldId id="256" r:id="rId5"/>
     <p:sldId id="270" r:id="rId6"/>
-    <p:sldId id="283" r:id="rId7"/>
-    <p:sldId id="282" r:id="rId8"/>
-    <p:sldId id="278" r:id="rId9"/>
-    <p:sldId id="279" r:id="rId10"/>
-    <p:sldId id="280" r:id="rId11"/>
-    <p:sldId id="294" r:id="rId12"/>
-    <p:sldId id="295" r:id="rId13"/>
-    <p:sldId id="271" r:id="rId14"/>
-    <p:sldId id="272" r:id="rId15"/>
-    <p:sldId id="273" r:id="rId16"/>
-    <p:sldId id="277" r:id="rId17"/>
-    <p:sldId id="297" r:id="rId18"/>
-    <p:sldId id="281" r:id="rId19"/>
-    <p:sldId id="284" r:id="rId20"/>
-    <p:sldId id="296" r:id="rId21"/>
-    <p:sldId id="267" r:id="rId22"/>
+    <p:sldId id="298" r:id="rId7"/>
+    <p:sldId id="283" r:id="rId8"/>
+    <p:sldId id="299" r:id="rId9"/>
+    <p:sldId id="300" r:id="rId10"/>
+    <p:sldId id="282" r:id="rId11"/>
+    <p:sldId id="271" r:id="rId12"/>
+    <p:sldId id="272" r:id="rId13"/>
+    <p:sldId id="273" r:id="rId14"/>
+    <p:sldId id="277" r:id="rId15"/>
+    <p:sldId id="297" r:id="rId16"/>
+    <p:sldId id="281" r:id="rId17"/>
+    <p:sldId id="284" r:id="rId18"/>
+    <p:sldId id="296" r:id="rId19"/>
+    <p:sldId id="267" r:id="rId20"/>
   </p:sldIdLst>
   <p:sldSz cx="12192000" cy="6858000"/>
   <p:notesSz cx="6858000" cy="9144000"/>
@@ -245,7 +243,7 @@
             <a:pPr rtl="0"/>
             <a:fld id="{AB6668A0-F58D-414D-AE91-080F13B20938}" type="datetime1">
               <a:rPr lang="fr-CA" smtClean="0"/>
-              <a:t>2023-05-08</a:t>
+              <a:t>2023-05-09</a:t>
             </a:fld>
             <a:endParaRPr lang="fr-CA"/>
           </a:p>
@@ -427,7 +425,7 @@
             <a:pPr rtl="0"/>
             <a:fld id="{F26646BE-8F4D-433F-8E37-8867BEC0AD1D}" type="datetime1">
               <a:rPr lang="fr-CA" noProof="0" smtClean="0"/>
-              <a:t>2023-05-08</a:t>
+              <a:t>2023-05-09</a:t>
             </a:fld>
             <a:endParaRPr lang="fr-CA" noProof="0"/>
           </a:p>
@@ -851,7 +849,7 @@
             <a:pPr rtl="0"/>
             <a:fld id="{EE000EEB-8338-48D7-8EE8-EE0082EF7602}" type="slidenum">
               <a:rPr lang="fr-CA" smtClean="0"/>
-              <a:t>18</a:t>
+              <a:t>16</a:t>
             </a:fld>
             <a:endParaRPr lang="fr-CA"/>
           </a:p>
@@ -1056,7 +1054,7 @@
             <a:pPr rtl="0"/>
             <a:fld id="{22B980AB-746C-45BA-88C2-AEB09BE6567D}" type="datetime1">
               <a:rPr lang="fr-CA" noProof="0" smtClean="0"/>
-              <a:t>2023-05-08</a:t>
+              <a:t>2023-05-09</a:t>
             </a:fld>
             <a:endParaRPr lang="fr-CA" noProof="0"/>
           </a:p>
@@ -1330,7 +1328,7 @@
             <a:pPr rtl="0"/>
             <a:fld id="{C4AF0A8B-8F95-431E-B747-EAC700012099}" type="datetime1">
               <a:rPr lang="fr-CA" noProof="0" smtClean="0"/>
-              <a:t>2023-05-08</a:t>
+              <a:t>2023-05-09</a:t>
             </a:fld>
             <a:endParaRPr lang="fr-CA" noProof="0"/>
           </a:p>
@@ -1523,7 +1521,7 @@
             <a:pPr rtl="0"/>
             <a:fld id="{7E47EABE-C646-4463-BD1D-3BE88FD78DE4}" type="datetime1">
               <a:rPr lang="fr-CA" noProof="0" smtClean="0"/>
-              <a:t>2023-05-08</a:t>
+              <a:t>2023-05-09</a:t>
             </a:fld>
             <a:endParaRPr lang="fr-CA" noProof="0"/>
           </a:p>
@@ -1790,7 +1788,7 @@
             <a:pPr rtl="0"/>
             <a:fld id="{F4FE871D-9D12-4A9F-8391-4599A82FA4E1}" type="datetime1">
               <a:rPr lang="fr-CA" noProof="0" smtClean="0"/>
-              <a:t>2023-05-08</a:t>
+              <a:t>2023-05-09</a:t>
             </a:fld>
             <a:endParaRPr lang="fr-CA" noProof="0"/>
           </a:p>
@@ -2121,7 +2119,7 @@
             <a:pPr rtl="0"/>
             <a:fld id="{E4728C79-8334-4362-A40F-B13C3AD662B3}" type="datetime1">
               <a:rPr lang="fr-CA" noProof="0" smtClean="0"/>
-              <a:t>2023-05-08</a:t>
+              <a:t>2023-05-09</a:t>
             </a:fld>
             <a:endParaRPr lang="fr-CA" noProof="0"/>
           </a:p>
@@ -2730,7 +2728,7 @@
             <a:pPr rtl="0"/>
             <a:fld id="{3760A96E-7419-4DC9-ACC1-457194A0BF5A}" type="datetime1">
               <a:rPr lang="fr-CA" noProof="0" smtClean="0"/>
-              <a:t>2023-05-08</a:t>
+              <a:t>2023-05-09</a:t>
             </a:fld>
             <a:endParaRPr lang="fr-CA" noProof="0"/>
           </a:p>
@@ -3576,7 +3574,7 @@
             <a:pPr rtl="0"/>
             <a:fld id="{9DDBA650-E13C-46BA-9E81-D7951B6F7C8F}" type="datetime1">
               <a:rPr lang="fr-CA" noProof="0" smtClean="0"/>
-              <a:t>2023-05-08</a:t>
+              <a:t>2023-05-09</a:t>
             </a:fld>
             <a:endParaRPr lang="fr-CA" noProof="0"/>
           </a:p>
@@ -3744,7 +3742,7 @@
             <a:pPr rtl="0"/>
             <a:fld id="{636CB366-30DD-47D9-BAE9-C2CE05E36DDE}" type="datetime1">
               <a:rPr lang="fr-CA" noProof="0" smtClean="0"/>
-              <a:t>2023-05-08</a:t>
+              <a:t>2023-05-09</a:t>
             </a:fld>
             <a:endParaRPr lang="fr-CA" noProof="0"/>
           </a:p>
@@ -3922,7 +3920,7 @@
             <a:pPr rtl="0"/>
             <a:fld id="{9D36D925-BA7A-4BB4-9E76-575AE5BC3B88}" type="datetime1">
               <a:rPr lang="fr-CA" noProof="0" smtClean="0"/>
-              <a:t>2023-05-08</a:t>
+              <a:t>2023-05-09</a:t>
             </a:fld>
             <a:endParaRPr lang="fr-CA" noProof="0"/>
           </a:p>
@@ -4090,7 +4088,7 @@
             <a:pPr rtl="0"/>
             <a:fld id="{B661899C-B772-4425-9A25-7323E057CD4F}" type="datetime1">
               <a:rPr lang="fr-CA" noProof="0" smtClean="0"/>
-              <a:t>2023-05-08</a:t>
+              <a:t>2023-05-09</a:t>
             </a:fld>
             <a:endParaRPr lang="fr-CA" noProof="0"/>
           </a:p>
@@ -4333,7 +4331,7 @@
             <a:pPr rtl="0"/>
             <a:fld id="{CA2EB567-1910-44B6-9583-AA7295650C9F}" type="datetime1">
               <a:rPr lang="fr-CA" noProof="0" smtClean="0"/>
-              <a:t>2023-05-08</a:t>
+              <a:t>2023-05-09</a:t>
             </a:fld>
             <a:endParaRPr lang="fr-CA" noProof="0"/>
           </a:p>
@@ -4622,7 +4620,7 @@
             <a:pPr rtl="0"/>
             <a:fld id="{E2A09355-6301-4C75-A7C1-066F8B35CC33}" type="datetime1">
               <a:rPr lang="fr-CA" noProof="0" smtClean="0"/>
-              <a:t>2023-05-08</a:t>
+              <a:t>2023-05-09</a:t>
             </a:fld>
             <a:endParaRPr lang="fr-CA" noProof="0"/>
           </a:p>
@@ -5057,7 +5055,7 @@
             <a:pPr rtl="0"/>
             <a:fld id="{A6968EE5-D8B6-4962-A3CB-3B875D0DC086}" type="datetime1">
               <a:rPr lang="fr-CA" noProof="0" smtClean="0"/>
-              <a:t>2023-05-08</a:t>
+              <a:t>2023-05-09</a:t>
             </a:fld>
             <a:endParaRPr lang="fr-CA" noProof="0"/>
           </a:p>
@@ -5174,7 +5172,7 @@
             <a:pPr rtl="0"/>
             <a:fld id="{ED3E2041-39F1-407B-8F27-B1AD4AAB3662}" type="datetime1">
               <a:rPr lang="fr-CA" noProof="0" smtClean="0"/>
-              <a:t>2023-05-08</a:t>
+              <a:t>2023-05-09</a:t>
             </a:fld>
             <a:endParaRPr lang="fr-CA" noProof="0"/>
           </a:p>
@@ -5267,7 +5265,7 @@
             <a:pPr rtl="0"/>
             <a:fld id="{EA2E2A80-2DE7-458D-A160-E32CE03B4829}" type="datetime1">
               <a:rPr lang="fr-CA" noProof="0" smtClean="0"/>
-              <a:t>2023-05-08</a:t>
+              <a:t>2023-05-09</a:t>
             </a:fld>
             <a:endParaRPr lang="fr-CA" noProof="0"/>
           </a:p>
@@ -5544,7 +5542,7 @@
             <a:pPr rtl="0"/>
             <a:fld id="{4F0B7DB0-C955-4F94-8EC4-2CC64A3E549C}" type="datetime1">
               <a:rPr lang="fr-CA" noProof="0" smtClean="0"/>
-              <a:t>2023-05-08</a:t>
+              <a:t>2023-05-09</a:t>
             </a:fld>
             <a:endParaRPr lang="fr-CA" noProof="0"/>
           </a:p>
@@ -5818,7 +5816,7 @@
             <a:pPr rtl="0"/>
             <a:fld id="{7A24FBEF-8C6D-4424-803F-7CDF60EB21CE}" type="datetime1">
               <a:rPr lang="fr-CA" noProof="0" smtClean="0"/>
-              <a:t>2023-05-08</a:t>
+              <a:t>2023-05-09</a:t>
             </a:fld>
             <a:endParaRPr lang="fr-CA" noProof="0"/>
           </a:p>
@@ -6244,7 +6242,7 @@
             <a:pPr rtl="0"/>
             <a:fld id="{60B728C0-8DF7-4BDD-B8CD-12FF7C2A3ABA}" type="datetime1">
               <a:rPr lang="fr-CA" noProof="1" smtClean="0"/>
-              <a:t>2023-05-08</a:t>
+              <a:t>2023-05-09</a:t>
             </a:fld>
             <a:endParaRPr lang="fr-CA" noProof="1"/>
           </a:p>
@@ -7105,568 +7103,6 @@
           <p:cNvPr id="2" name="Title 1">
             <a:extLst>
               <a:ext uri="{FF2B5EF4-FFF2-40B4-BE49-F238E27FC236}">
-                <a16:creationId xmlns:a16="http://schemas.microsoft.com/office/drawing/2014/main" id="{936D8D2F-6EEF-994B-7902-D0E09E827B6B}"/>
-              </a:ext>
-            </a:extLst>
-          </p:cNvPr>
-          <p:cNvSpPr>
-            <a:spLocks noGrp="1"/>
-          </p:cNvSpPr>
-          <p:nvPr>
-            <p:ph type="title"/>
-          </p:nvPr>
-        </p:nvSpPr>
-        <p:spPr/>
-        <p:txBody>
-          <a:bodyPr/>
-          <a:lstStyle/>
-          <a:p>
-            <a:r>
-              <a:rPr lang="fr-CA" dirty="0"/>
-              <a:t>Les utilisations de Python et les bibliothèques populaires (partie1)</a:t>
-            </a:r>
-          </a:p>
-        </p:txBody>
-      </p:sp>
-      <p:sp>
-        <p:nvSpPr>
-          <p:cNvPr id="3" name="Content Placeholder 2">
-            <a:extLst>
-              <a:ext uri="{FF2B5EF4-FFF2-40B4-BE49-F238E27FC236}">
-                <a16:creationId xmlns:a16="http://schemas.microsoft.com/office/drawing/2014/main" id="{6C1418B3-8105-063B-13B2-98DF0F58019D}"/>
-              </a:ext>
-            </a:extLst>
-          </p:cNvPr>
-          <p:cNvSpPr>
-            <a:spLocks noGrp="1"/>
-          </p:cNvSpPr>
-          <p:nvPr>
-            <p:ph idx="1"/>
-          </p:nvPr>
-        </p:nvSpPr>
-        <p:spPr/>
-        <p:txBody>
-          <a:bodyPr/>
-          <a:lstStyle/>
-          <a:p>
-            <a:r>
-              <a:rPr lang="fr-CA" dirty="0"/>
-              <a:t>Développement web</a:t>
-            </a:r>
-          </a:p>
-          <a:p>
-            <a:pPr lvl="1"/>
-            <a:r>
-              <a:rPr lang="fr-CA" dirty="0"/>
-              <a:t>Flask</a:t>
-            </a:r>
-          </a:p>
-          <a:p>
-            <a:pPr lvl="1"/>
-            <a:r>
-              <a:rPr lang="fr-CA" dirty="0"/>
-              <a:t>Django</a:t>
-            </a:r>
-          </a:p>
-          <a:p>
-            <a:pPr lvl="1"/>
-            <a:r>
-              <a:rPr lang="fr-CA" dirty="0" err="1"/>
-              <a:t>Pyramid</a:t>
-            </a:r>
-            <a:endParaRPr lang="fr-CA" dirty="0"/>
-          </a:p>
-          <a:p>
-            <a:pPr lvl="1"/>
-            <a:endParaRPr lang="fr-CA" dirty="0"/>
-          </a:p>
-          <a:p>
-            <a:r>
-              <a:rPr lang="fr-CA" dirty="0"/>
-              <a:t>Science des données</a:t>
-            </a:r>
-          </a:p>
-          <a:p>
-            <a:pPr lvl="1"/>
-            <a:r>
-              <a:rPr lang="fr-CA" dirty="0" err="1"/>
-              <a:t>Numpy</a:t>
-            </a:r>
-            <a:endParaRPr lang="fr-CA" dirty="0"/>
-          </a:p>
-          <a:p>
-            <a:pPr lvl="1"/>
-            <a:r>
-              <a:rPr lang="fr-CA" dirty="0"/>
-              <a:t>Pandas</a:t>
-            </a:r>
-          </a:p>
-          <a:p>
-            <a:pPr lvl="1"/>
-            <a:r>
-              <a:rPr lang="fr-CA" dirty="0" err="1"/>
-              <a:t>Matplotlib</a:t>
-            </a:r>
-            <a:endParaRPr lang="fr-CA" dirty="0"/>
-          </a:p>
-        </p:txBody>
-      </p:sp>
-      <p:pic>
-        <p:nvPicPr>
-          <p:cNvPr id="4" name="Picture 3" descr="Icon&#10;&#10;Description automatically generated">
-            <a:extLst>
-              <a:ext uri="{FF2B5EF4-FFF2-40B4-BE49-F238E27FC236}">
-                <a16:creationId xmlns:a16="http://schemas.microsoft.com/office/drawing/2014/main" id="{586E031D-3402-A740-B6DA-BEFD3D3F075B}"/>
-              </a:ext>
-            </a:extLst>
-          </p:cNvPr>
-          <p:cNvPicPr>
-            <a:picLocks noChangeAspect="1"/>
-          </p:cNvPicPr>
-          <p:nvPr/>
-        </p:nvPicPr>
-        <p:blipFill>
-          <a:blip r:embed="rId2">
-            <a:extLst>
-              <a:ext uri="{BEBA8EAE-BF5A-486C-A8C5-ECC9F3942E4B}">
-                <a14:imgProps xmlns:a14="http://schemas.microsoft.com/office/drawing/2010/main">
-                  <a14:imgLayer r:embed="rId3">
-                    <a14:imgEffect>
-                      <a14:backgroundRemoval t="0" b="98889" l="0" r="95833">
-                        <a14:foregroundMark x1="45839" y1="21123" x2="65864" y2="34817"/>
-                        <a14:foregroundMark x1="37451" y1="15387" x2="38997" y2="16444"/>
-                        <a14:foregroundMark x1="65773" y1="33981" x2="65556" y2="38056"/>
-                        <a14:foregroundMark x1="66672" y1="17060" x2="66005" y2="29601"/>
-                        <a14:foregroundMark x1="65970" y1="35791" x2="48219" y2="46292"/>
-                        <a14:foregroundMark x1="43975" y1="34426" x2="11944" y2="52500"/>
-                        <a14:foregroundMark x1="11944" y1="52500" x2="26713" y2="65767"/>
-                        <a14:foregroundMark x1="45981" y1="54263" x2="37423" y2="59567"/>
-                        <a14:foregroundMark x1="63414" y1="43459" x2="55659" y2="48265"/>
-                        <a14:foregroundMark x1="64146" y1="45021" x2="62830" y2="46337"/>
-                        <a14:foregroundMark x1="64840" y1="41320" x2="47508" y2="46292"/>
-                        <a14:foregroundMark x1="65029" y1="50884" x2="63333" y2="55278"/>
-                        <a14:foregroundMark x1="61522" y1="86384" x2="67510" y2="80163"/>
-                        <a14:foregroundMark x1="52500" y1="36111" x2="49722" y2="31944"/>
-                        <a14:foregroundMark x1="55556" y1="33056" x2="43056" y2="32778"/>
-                        <a14:foregroundMark x1="41944" y1="15833" x2="46389" y2="20833"/>
-                        <a14:foregroundMark x1="43611" y1="11944" x2="59167" y2="12500"/>
-                        <a14:foregroundMark x1="67222" y1="18889" x2="67469" y2="38855"/>
-                        <a14:foregroundMark x1="38611" y1="47500" x2="29167" y2="52778"/>
-                        <a14:foregroundMark x1="33133" y1="56389" x2="33611" y2="70278"/>
-                        <a14:foregroundMark x1="33105" y1="55556" x2="33133" y2="56389"/>
-                        <a14:foregroundMark x1="33094" y1="55248" x2="33105" y2="55556"/>
-                        <a14:foregroundMark x1="36667" y1="67778" x2="38611" y2="63333"/>
-                        <a14:foregroundMark x1="38611" y1="65278" x2="57500" y2="55000"/>
-                        <a14:foregroundMark x1="39722" y1="61667" x2="36389" y2="67500"/>
-                        <a14:foregroundMark x1="55833" y1="73056" x2="63889" y2="75000"/>
-                        <a14:foregroundMark x1="46667" y1="68056" x2="50618" y2="69444"/>
-                        <a14:foregroundMark x1="53333" y1="53056" x2="67500" y2="52222"/>
-                        <a14:foregroundMark x1="71074" y1="40975" x2="71111" y2="40556"/>
-                        <a14:foregroundMark x1="70278" y1="50000" x2="70393" y2="48694"/>
-                        <a14:foregroundMark x1="72222" y1="41111" x2="71944" y2="40278"/>
-                        <a14:foregroundMark x1="72445" y1="41781" x2="72222" y2="41111"/>
-                        <a14:foregroundMark x1="74444" y1="47778" x2="73587" y2="45206"/>
-                        <a14:foregroundMark x1="68156" y1="47379" x2="67222" y2="48611"/>
-                        <a14:foregroundMark x1="72904" y1="41111" x2="72411" y2="41761"/>
-                        <a14:foregroundMark x1="74167" y1="39444" x2="72904" y2="41111"/>
-                        <a14:foregroundMark x1="72778" y1="31944" x2="80000" y2="33333"/>
-                        <a14:foregroundMark x1="33333" y1="55000" x2="33333" y2="55000"/>
-                        <a14:foregroundMark x1="33333" y1="55556" x2="33333" y2="55556"/>
-                        <a14:foregroundMark x1="33889" y1="55556" x2="32785" y2="55924"/>
-                        <a14:foregroundMark x1="50278" y1="69167" x2="51471" y2="69316"/>
-                        <a14:backgroundMark x1="13611" y1="8056" x2="15000" y2="12500"/>
-                        <a14:backgroundMark x1="20833" y1="8333" x2="15833" y2="24444"/>
-                        <a14:backgroundMark x1="26111" y1="8889" x2="25278" y2="26389"/>
-                        <a14:backgroundMark x1="20556" y1="1667" x2="83333" y2="1111"/>
-                        <a14:backgroundMark x1="83333" y1="1111" x2="98056" y2="1667"/>
-                        <a14:backgroundMark x1="96667" y1="5000" x2="9167" y2="5278"/>
-                        <a14:backgroundMark x1="278" y1="833" x2="1111" y2="48333"/>
-                        <a14:backgroundMark x1="1111" y1="48333" x2="1667" y2="49722"/>
-                        <a14:backgroundMark x1="556" y1="833" x2="16389" y2="14444"/>
-                        <a14:backgroundMark x1="10000" y1="10000" x2="3333" y2="16667"/>
-                        <a14:backgroundMark x1="33611" y1="11389" x2="33611" y2="11389"/>
-                        <a14:backgroundMark x1="39167" y1="10000" x2="39167" y2="10000"/>
-                        <a14:backgroundMark x1="33889" y1="9444" x2="29167" y2="11111"/>
-                        <a14:backgroundMark x1="40556" y1="8889" x2="29444" y2="14167"/>
-                        <a14:backgroundMark x1="35833" y1="9722" x2="30278" y2="16111"/>
-                        <a14:backgroundMark x1="30278" y1="16667" x2="29722" y2="26944"/>
-                        <a14:backgroundMark x1="21389" y1="29722" x2="41510" y2="30314"/>
-                        <a14:backgroundMark x1="28611" y1="15000" x2="31389" y2="18611"/>
-                        <a14:backgroundMark x1="278" y1="28889" x2="2500" y2="99444"/>
-                        <a14:backgroundMark x1="10000" y1="99722" x2="53056" y2="98611"/>
-                        <a14:backgroundMark x1="69444" y1="95278" x2="49444" y2="97222"/>
-                        <a14:backgroundMark x1="66667" y1="91389" x2="48889" y2="93056"/>
-                        <a14:backgroundMark x1="63056" y1="88056" x2="56667" y2="91389"/>
-                        <a14:backgroundMark x1="69722" y1="73333" x2="73889" y2="83056"/>
-                        <a14:backgroundMark x1="63056" y1="77500" x2="63056" y2="79167"/>
-                        <a14:backgroundMark x1="60183" y1="78569" x2="60000" y2="78889"/>
-                        <a14:backgroundMark x1="82500" y1="70000" x2="60884" y2="69810"/>
-                        <a14:backgroundMark x1="64029" y1="48545" x2="65574" y2="47542"/>
-                        <a14:backgroundMark x1="68678" y1="18871" x2="68889" y2="12500"/>
-                        <a14:backgroundMark x1="55038" y1="50278" x2="41229" y2="50278"/>
-                        <a14:backgroundMark x1="30687" y1="70379" x2="30556" y2="71111"/>
-                        <a14:backgroundMark x1="69722" y1="10000" x2="74718" y2="29266"/>
-                        <a14:backgroundMark x1="82565" y1="29791" x2="92778" y2="40556"/>
-                        <a14:backgroundMark x1="72222" y1="18889" x2="82189" y2="29395"/>
-                        <a14:backgroundMark x1="89444" y1="35278" x2="92222" y2="68889"/>
-                        <a14:backgroundMark x1="95556" y1="41667" x2="98056" y2="92222"/>
-                        <a14:backgroundMark x1="98333" y1="80000" x2="98056" y2="98056"/>
-                        <a14:backgroundMark x1="96944" y1="90833" x2="64444" y2="95278"/>
-                        <a14:backgroundMark x1="44390" y1="10748" x2="33611" y2="10556"/>
-                        <a14:backgroundMark x1="64722" y1="11111" x2="60125" y2="11029"/>
-                        <a14:backgroundMark x1="59830" y1="11482" x2="75833" y2="13889"/>
-                        <a14:backgroundMark x1="44444" y1="9167" x2="45333" y2="9301"/>
-                        <a14:backgroundMark x1="37500" y1="20000" x2="39569" y2="20239"/>
-                        <a14:backgroundMark x1="55272" y1="49896" x2="47778" y2="50833"/>
-                        <a14:backgroundMark x1="70278" y1="41111" x2="70278" y2="41111"/>
-                        <a14:backgroundMark x1="70833" y1="40833" x2="66944" y2="46667"/>
-                        <a14:backgroundMark x1="56111" y1="70000" x2="51944" y2="70556"/>
-                        <a14:backgroundMark x1="32778" y1="55000" x2="32778" y2="55000"/>
-                        <a14:backgroundMark x1="32222" y1="56389" x2="32222" y2="56389"/>
-                        <a14:backgroundMark x1="31389" y1="56111" x2="33333" y2="54722"/>
-                        <a14:backgroundMark x1="32500" y1="55556" x2="32500" y2="55556"/>
-                        <a14:backgroundMark x1="51111" y1="69444" x2="51111" y2="69444"/>
-                        <a14:backgroundMark x1="51389" y1="69444" x2="52778" y2="69444"/>
-                      </a14:backgroundRemoval>
-                    </a14:imgEffect>
-                  </a14:imgLayer>
-                </a14:imgProps>
-              </a:ext>
-            </a:extLst>
-          </a:blip>
-          <a:stretch>
-            <a:fillRect/>
-          </a:stretch>
-        </p:blipFill>
-        <p:spPr>
-          <a:xfrm>
-            <a:off x="11086306" y="0"/>
-            <a:ext cx="1143000" cy="1143000"/>
-          </a:xfrm>
-          <a:prstGeom prst="rect">
-            <a:avLst/>
-          </a:prstGeom>
-        </p:spPr>
-      </p:pic>
-    </p:spTree>
-    <p:extLst>
-      <p:ext uri="{BB962C8B-B14F-4D97-AF65-F5344CB8AC3E}">
-        <p14:creationId xmlns:p14="http://schemas.microsoft.com/office/powerpoint/2010/main" val="1775829582"/>
-      </p:ext>
-    </p:extLst>
-  </p:cSld>
-  <p:clrMapOvr>
-    <a:masterClrMapping/>
-  </p:clrMapOvr>
-</p:sld>
-</file>
-
-<file path=ppt/slides/slide11.xml><?xml version="1.0" encoding="utf-8"?>
-<p:sld xmlns:a="http://schemas.openxmlformats.org/drawingml/2006/main" xmlns:r="http://schemas.openxmlformats.org/officeDocument/2006/relationships" xmlns:p="http://schemas.openxmlformats.org/presentationml/2006/main">
-  <p:cSld>
-    <p:spTree>
-      <p:nvGrpSpPr>
-        <p:cNvPr id="1" name=""/>
-        <p:cNvGrpSpPr/>
-        <p:nvPr/>
-      </p:nvGrpSpPr>
-      <p:grpSpPr>
-        <a:xfrm>
-          <a:off x="0" y="0"/>
-          <a:ext cx="0" cy="0"/>
-          <a:chOff x="0" y="0"/>
-          <a:chExt cx="0" cy="0"/>
-        </a:xfrm>
-      </p:grpSpPr>
-      <p:sp>
-        <p:nvSpPr>
-          <p:cNvPr id="2" name="Title 1">
-            <a:extLst>
-              <a:ext uri="{FF2B5EF4-FFF2-40B4-BE49-F238E27FC236}">
-                <a16:creationId xmlns:a16="http://schemas.microsoft.com/office/drawing/2014/main" id="{F2418D01-2D04-9BE2-814C-70AD626FEFE9}"/>
-              </a:ext>
-            </a:extLst>
-          </p:cNvPr>
-          <p:cNvSpPr>
-            <a:spLocks noGrp="1"/>
-          </p:cNvSpPr>
-          <p:nvPr>
-            <p:ph type="title"/>
-          </p:nvPr>
-        </p:nvSpPr>
-        <p:spPr/>
-        <p:txBody>
-          <a:bodyPr/>
-          <a:lstStyle/>
-          <a:p>
-            <a:r>
-              <a:rPr lang="fr-CA" dirty="0"/>
-              <a:t>Les utilisations de Python et les bibliothèques populaires (partie2)</a:t>
-            </a:r>
-          </a:p>
-        </p:txBody>
-      </p:sp>
-      <p:sp>
-        <p:nvSpPr>
-          <p:cNvPr id="3" name="Content Placeholder 2">
-            <a:extLst>
-              <a:ext uri="{FF2B5EF4-FFF2-40B4-BE49-F238E27FC236}">
-                <a16:creationId xmlns:a16="http://schemas.microsoft.com/office/drawing/2014/main" id="{7CF96080-8A40-AEB3-4895-6693EF61324E}"/>
-              </a:ext>
-            </a:extLst>
-          </p:cNvPr>
-          <p:cNvSpPr>
-            <a:spLocks noGrp="1"/>
-          </p:cNvSpPr>
-          <p:nvPr>
-            <p:ph idx="1"/>
-          </p:nvPr>
-        </p:nvSpPr>
-        <p:spPr/>
-        <p:txBody>
-          <a:bodyPr/>
-          <a:lstStyle/>
-          <a:p>
-            <a:r>
-              <a:rPr lang="fr-CA" dirty="0"/>
-              <a:t>Intelligence artificielle</a:t>
-            </a:r>
-          </a:p>
-          <a:p>
-            <a:pPr lvl="1"/>
-            <a:r>
-              <a:rPr lang="fr-CA" dirty="0" err="1"/>
-              <a:t>TensorFlow</a:t>
-            </a:r>
-            <a:endParaRPr lang="fr-CA" dirty="0"/>
-          </a:p>
-          <a:p>
-            <a:pPr lvl="1"/>
-            <a:r>
-              <a:rPr lang="fr-CA" dirty="0" err="1"/>
-              <a:t>PyTorch</a:t>
-            </a:r>
-            <a:endParaRPr lang="fr-CA" dirty="0"/>
-          </a:p>
-          <a:p>
-            <a:pPr lvl="1"/>
-            <a:r>
-              <a:rPr lang="fr-CA" dirty="0" err="1"/>
-              <a:t>Keras</a:t>
-            </a:r>
-            <a:endParaRPr lang="fr-CA" dirty="0"/>
-          </a:p>
-          <a:p>
-            <a:pPr lvl="1"/>
-            <a:endParaRPr lang="fr-CA" dirty="0"/>
-          </a:p>
-          <a:p>
-            <a:r>
-              <a:rPr lang="fr-CA" dirty="0"/>
-              <a:t>Automatisation de tâches</a:t>
-            </a:r>
-          </a:p>
-          <a:p>
-            <a:pPr lvl="1"/>
-            <a:r>
-              <a:rPr lang="fr-CA" dirty="0" err="1"/>
-              <a:t>Selenium</a:t>
-            </a:r>
-            <a:endParaRPr lang="fr-CA" dirty="0"/>
-          </a:p>
-          <a:p>
-            <a:pPr lvl="1"/>
-            <a:r>
-              <a:rPr lang="fr-CA" dirty="0" err="1"/>
-              <a:t>PyAutoGUI</a:t>
-            </a:r>
-            <a:endParaRPr lang="fr-CA" dirty="0"/>
-          </a:p>
-          <a:p>
-            <a:pPr lvl="1"/>
-            <a:r>
-              <a:rPr lang="fr-CA" dirty="0" err="1"/>
-              <a:t>Pywinauto</a:t>
-            </a:r>
-            <a:endParaRPr lang="fr-CA" dirty="0"/>
-          </a:p>
-          <a:p>
-            <a:endParaRPr lang="fr-CA" dirty="0"/>
-          </a:p>
-        </p:txBody>
-      </p:sp>
-      <p:pic>
-        <p:nvPicPr>
-          <p:cNvPr id="4" name="Picture 3" descr="Icon&#10;&#10;Description automatically generated">
-            <a:extLst>
-              <a:ext uri="{FF2B5EF4-FFF2-40B4-BE49-F238E27FC236}">
-                <a16:creationId xmlns:a16="http://schemas.microsoft.com/office/drawing/2014/main" id="{8F10C40B-BA8B-6973-3469-E9371BB8A75D}"/>
-              </a:ext>
-            </a:extLst>
-          </p:cNvPr>
-          <p:cNvPicPr>
-            <a:picLocks noChangeAspect="1"/>
-          </p:cNvPicPr>
-          <p:nvPr/>
-        </p:nvPicPr>
-        <p:blipFill>
-          <a:blip r:embed="rId2">
-            <a:extLst>
-              <a:ext uri="{BEBA8EAE-BF5A-486C-A8C5-ECC9F3942E4B}">
-                <a14:imgProps xmlns:a14="http://schemas.microsoft.com/office/drawing/2010/main">
-                  <a14:imgLayer r:embed="rId3">
-                    <a14:imgEffect>
-                      <a14:backgroundRemoval t="0" b="98889" l="0" r="95833">
-                        <a14:foregroundMark x1="45839" y1="21123" x2="65864" y2="34817"/>
-                        <a14:foregroundMark x1="37451" y1="15387" x2="38997" y2="16444"/>
-                        <a14:foregroundMark x1="65773" y1="33981" x2="65556" y2="38056"/>
-                        <a14:foregroundMark x1="66672" y1="17060" x2="66005" y2="29601"/>
-                        <a14:foregroundMark x1="65970" y1="35791" x2="48219" y2="46292"/>
-                        <a14:foregroundMark x1="43975" y1="34426" x2="11944" y2="52500"/>
-                        <a14:foregroundMark x1="11944" y1="52500" x2="26713" y2="65767"/>
-                        <a14:foregroundMark x1="45981" y1="54263" x2="37423" y2="59567"/>
-                        <a14:foregroundMark x1="63414" y1="43459" x2="55659" y2="48265"/>
-                        <a14:foregroundMark x1="64146" y1="45021" x2="62830" y2="46337"/>
-                        <a14:foregroundMark x1="64840" y1="41320" x2="47508" y2="46292"/>
-                        <a14:foregroundMark x1="65029" y1="50884" x2="63333" y2="55278"/>
-                        <a14:foregroundMark x1="61522" y1="86384" x2="67510" y2="80163"/>
-                        <a14:foregroundMark x1="52500" y1="36111" x2="49722" y2="31944"/>
-                        <a14:foregroundMark x1="55556" y1="33056" x2="43056" y2="32778"/>
-                        <a14:foregroundMark x1="41944" y1="15833" x2="46389" y2="20833"/>
-                        <a14:foregroundMark x1="43611" y1="11944" x2="59167" y2="12500"/>
-                        <a14:foregroundMark x1="67222" y1="18889" x2="67469" y2="38855"/>
-                        <a14:foregroundMark x1="38611" y1="47500" x2="29167" y2="52778"/>
-                        <a14:foregroundMark x1="33133" y1="56389" x2="33611" y2="70278"/>
-                        <a14:foregroundMark x1="33105" y1="55556" x2="33133" y2="56389"/>
-                        <a14:foregroundMark x1="33094" y1="55248" x2="33105" y2="55556"/>
-                        <a14:foregroundMark x1="36667" y1="67778" x2="38611" y2="63333"/>
-                        <a14:foregroundMark x1="38611" y1="65278" x2="57500" y2="55000"/>
-                        <a14:foregroundMark x1="39722" y1="61667" x2="36389" y2="67500"/>
-                        <a14:foregroundMark x1="55833" y1="73056" x2="63889" y2="75000"/>
-                        <a14:foregroundMark x1="46667" y1="68056" x2="50618" y2="69444"/>
-                        <a14:foregroundMark x1="53333" y1="53056" x2="67500" y2="52222"/>
-                        <a14:foregroundMark x1="71074" y1="40975" x2="71111" y2="40556"/>
-                        <a14:foregroundMark x1="70278" y1="50000" x2="70393" y2="48694"/>
-                        <a14:foregroundMark x1="72222" y1="41111" x2="71944" y2="40278"/>
-                        <a14:foregroundMark x1="72445" y1="41781" x2="72222" y2="41111"/>
-                        <a14:foregroundMark x1="74444" y1="47778" x2="73587" y2="45206"/>
-                        <a14:foregroundMark x1="68156" y1="47379" x2="67222" y2="48611"/>
-                        <a14:foregroundMark x1="72904" y1="41111" x2="72411" y2="41761"/>
-                        <a14:foregroundMark x1="74167" y1="39444" x2="72904" y2="41111"/>
-                        <a14:foregroundMark x1="72778" y1="31944" x2="80000" y2="33333"/>
-                        <a14:foregroundMark x1="33333" y1="55000" x2="33333" y2="55000"/>
-                        <a14:foregroundMark x1="33333" y1="55556" x2="33333" y2="55556"/>
-                        <a14:foregroundMark x1="33889" y1="55556" x2="32785" y2="55924"/>
-                        <a14:foregroundMark x1="50278" y1="69167" x2="51471" y2="69316"/>
-                        <a14:backgroundMark x1="13611" y1="8056" x2="15000" y2="12500"/>
-                        <a14:backgroundMark x1="20833" y1="8333" x2="15833" y2="24444"/>
-                        <a14:backgroundMark x1="26111" y1="8889" x2="25278" y2="26389"/>
-                        <a14:backgroundMark x1="20556" y1="1667" x2="83333" y2="1111"/>
-                        <a14:backgroundMark x1="83333" y1="1111" x2="98056" y2="1667"/>
-                        <a14:backgroundMark x1="96667" y1="5000" x2="9167" y2="5278"/>
-                        <a14:backgroundMark x1="278" y1="833" x2="1111" y2="48333"/>
-                        <a14:backgroundMark x1="1111" y1="48333" x2="1667" y2="49722"/>
-                        <a14:backgroundMark x1="556" y1="833" x2="16389" y2="14444"/>
-                        <a14:backgroundMark x1="10000" y1="10000" x2="3333" y2="16667"/>
-                        <a14:backgroundMark x1="33611" y1="11389" x2="33611" y2="11389"/>
-                        <a14:backgroundMark x1="39167" y1="10000" x2="39167" y2="10000"/>
-                        <a14:backgroundMark x1="33889" y1="9444" x2="29167" y2="11111"/>
-                        <a14:backgroundMark x1="40556" y1="8889" x2="29444" y2="14167"/>
-                        <a14:backgroundMark x1="35833" y1="9722" x2="30278" y2="16111"/>
-                        <a14:backgroundMark x1="30278" y1="16667" x2="29722" y2="26944"/>
-                        <a14:backgroundMark x1="21389" y1="29722" x2="41510" y2="30314"/>
-                        <a14:backgroundMark x1="28611" y1="15000" x2="31389" y2="18611"/>
-                        <a14:backgroundMark x1="278" y1="28889" x2="2500" y2="99444"/>
-                        <a14:backgroundMark x1="10000" y1="99722" x2="53056" y2="98611"/>
-                        <a14:backgroundMark x1="69444" y1="95278" x2="49444" y2="97222"/>
-                        <a14:backgroundMark x1="66667" y1="91389" x2="48889" y2="93056"/>
-                        <a14:backgroundMark x1="63056" y1="88056" x2="56667" y2="91389"/>
-                        <a14:backgroundMark x1="69722" y1="73333" x2="73889" y2="83056"/>
-                        <a14:backgroundMark x1="63056" y1="77500" x2="63056" y2="79167"/>
-                        <a14:backgroundMark x1="60183" y1="78569" x2="60000" y2="78889"/>
-                        <a14:backgroundMark x1="82500" y1="70000" x2="60884" y2="69810"/>
-                        <a14:backgroundMark x1="64029" y1="48545" x2="65574" y2="47542"/>
-                        <a14:backgroundMark x1="68678" y1="18871" x2="68889" y2="12500"/>
-                        <a14:backgroundMark x1="55038" y1="50278" x2="41229" y2="50278"/>
-                        <a14:backgroundMark x1="30687" y1="70379" x2="30556" y2="71111"/>
-                        <a14:backgroundMark x1="69722" y1="10000" x2="74718" y2="29266"/>
-                        <a14:backgroundMark x1="82565" y1="29791" x2="92778" y2="40556"/>
-                        <a14:backgroundMark x1="72222" y1="18889" x2="82189" y2="29395"/>
-                        <a14:backgroundMark x1="89444" y1="35278" x2="92222" y2="68889"/>
-                        <a14:backgroundMark x1="95556" y1="41667" x2="98056" y2="92222"/>
-                        <a14:backgroundMark x1="98333" y1="80000" x2="98056" y2="98056"/>
-                        <a14:backgroundMark x1="96944" y1="90833" x2="64444" y2="95278"/>
-                        <a14:backgroundMark x1="44390" y1="10748" x2="33611" y2="10556"/>
-                        <a14:backgroundMark x1="64722" y1="11111" x2="60125" y2="11029"/>
-                        <a14:backgroundMark x1="59830" y1="11482" x2="75833" y2="13889"/>
-                        <a14:backgroundMark x1="44444" y1="9167" x2="45333" y2="9301"/>
-                        <a14:backgroundMark x1="37500" y1="20000" x2="39569" y2="20239"/>
-                        <a14:backgroundMark x1="55272" y1="49896" x2="47778" y2="50833"/>
-                        <a14:backgroundMark x1="70278" y1="41111" x2="70278" y2="41111"/>
-                        <a14:backgroundMark x1="70833" y1="40833" x2="66944" y2="46667"/>
-                        <a14:backgroundMark x1="56111" y1="70000" x2="51944" y2="70556"/>
-                        <a14:backgroundMark x1="32778" y1="55000" x2="32778" y2="55000"/>
-                        <a14:backgroundMark x1="32222" y1="56389" x2="32222" y2="56389"/>
-                        <a14:backgroundMark x1="31389" y1="56111" x2="33333" y2="54722"/>
-                        <a14:backgroundMark x1="32500" y1="55556" x2="32500" y2="55556"/>
-                        <a14:backgroundMark x1="51111" y1="69444" x2="51111" y2="69444"/>
-                        <a14:backgroundMark x1="51389" y1="69444" x2="52778" y2="69444"/>
-                      </a14:backgroundRemoval>
-                    </a14:imgEffect>
-                  </a14:imgLayer>
-                </a14:imgProps>
-              </a:ext>
-            </a:extLst>
-          </a:blip>
-          <a:stretch>
-            <a:fillRect/>
-          </a:stretch>
-        </p:blipFill>
-        <p:spPr>
-          <a:xfrm>
-            <a:off x="11086306" y="0"/>
-            <a:ext cx="1143000" cy="1143000"/>
-          </a:xfrm>
-          <a:prstGeom prst="rect">
-            <a:avLst/>
-          </a:prstGeom>
-        </p:spPr>
-      </p:pic>
-    </p:spTree>
-    <p:extLst>
-      <p:ext uri="{BB962C8B-B14F-4D97-AF65-F5344CB8AC3E}">
-        <p14:creationId xmlns:p14="http://schemas.microsoft.com/office/powerpoint/2010/main" val="2097261974"/>
-      </p:ext>
-    </p:extLst>
-  </p:cSld>
-  <p:clrMapOvr>
-    <a:masterClrMapping/>
-  </p:clrMapOvr>
-</p:sld>
-</file>
-
-<file path=ppt/slides/slide12.xml><?xml version="1.0" encoding="utf-8"?>
-<p:sld xmlns:a="http://schemas.openxmlformats.org/drawingml/2006/main" xmlns:r="http://schemas.openxmlformats.org/officeDocument/2006/relationships" xmlns:p="http://schemas.openxmlformats.org/presentationml/2006/main">
-  <p:cSld>
-    <p:spTree>
-      <p:nvGrpSpPr>
-        <p:cNvPr id="1" name=""/>
-        <p:cNvGrpSpPr/>
-        <p:nvPr/>
-      </p:nvGrpSpPr>
-      <p:grpSpPr>
-        <a:xfrm>
-          <a:off x="0" y="0"/>
-          <a:ext cx="0" cy="0"/>
-          <a:chOff x="0" y="0"/>
-          <a:chExt cx="0" cy="0"/>
-        </a:xfrm>
-      </p:grpSpPr>
-      <p:sp>
-        <p:nvSpPr>
-          <p:cNvPr id="2" name="Title 1">
-            <a:extLst>
-              <a:ext uri="{FF2B5EF4-FFF2-40B4-BE49-F238E27FC236}">
                 <a16:creationId xmlns:a16="http://schemas.microsoft.com/office/drawing/2014/main" id="{72D5C303-D6FD-06BD-DE74-21E63B8ABCA3}"/>
               </a:ext>
             </a:extLst>
@@ -7931,7 +7367,7 @@
 </p:sld>
 </file>
 
-<file path=ppt/slides/slide13.xml><?xml version="1.0" encoding="utf-8"?>
+<file path=ppt/slides/slide11.xml><?xml version="1.0" encoding="utf-8"?>
 <p:sld xmlns:a="http://schemas.openxmlformats.org/drawingml/2006/main" xmlns:r="http://schemas.openxmlformats.org/officeDocument/2006/relationships" xmlns:p="http://schemas.openxmlformats.org/presentationml/2006/main">
   <p:cSld>
     <p:spTree>
@@ -8180,7 +7616,7 @@
 </p:sld>
 </file>
 
-<file path=ppt/slides/slide14.xml><?xml version="1.0" encoding="utf-8"?>
+<file path=ppt/slides/slide12.xml><?xml version="1.0" encoding="utf-8"?>
 <p:sld xmlns:a="http://schemas.openxmlformats.org/drawingml/2006/main" xmlns:r="http://schemas.openxmlformats.org/officeDocument/2006/relationships" xmlns:p="http://schemas.openxmlformats.org/presentationml/2006/main">
   <p:cSld>
     <p:spTree>
@@ -8449,7 +7885,7 @@
 </p:sld>
 </file>
 
-<file path=ppt/slides/slide15.xml><?xml version="1.0" encoding="utf-8"?>
+<file path=ppt/slides/slide13.xml><?xml version="1.0" encoding="utf-8"?>
 <p:sld xmlns:a="http://schemas.openxmlformats.org/drawingml/2006/main" xmlns:r="http://schemas.openxmlformats.org/officeDocument/2006/relationships" xmlns:p="http://schemas.openxmlformats.org/presentationml/2006/main">
   <p:cSld>
     <p:spTree>
@@ -8517,7 +7953,7 @@
           <a:p>
             <a:r>
               <a:rPr lang="fr-CA" dirty="0"/>
-              <a:t>Python est un langage:</a:t>
+              <a:t>Python est un langage qui est:</a:t>
             </a:r>
           </a:p>
           <a:p>
@@ -8718,7 +8154,7 @@
 </p:sld>
 </file>
 
-<file path=ppt/slides/slide16.xml><?xml version="1.0" encoding="utf-8"?>
+<file path=ppt/slides/slide14.xml><?xml version="1.0" encoding="utf-8"?>
 <p:sld xmlns:a="http://schemas.openxmlformats.org/drawingml/2006/main" xmlns:r="http://schemas.openxmlformats.org/officeDocument/2006/relationships" xmlns:p="http://schemas.openxmlformats.org/presentationml/2006/main">
   <p:cSld>
     <p:spTree>
@@ -8839,6 +8275,16 @@
             </a:r>
             <a:endParaRPr lang="fr-CA" dirty="0"/>
           </a:p>
+          <a:p>
+            <a:pPr lvl="1"/>
+            <a:r>
+              <a:rPr lang="fr-CA" dirty="0">
+                <a:hlinkClick r:id="rId4"/>
+              </a:rPr>
+              <a:t>Python Tutorial (w3schools.com)</a:t>
+            </a:r>
+            <a:endParaRPr lang="fr-CA" dirty="0"/>
+          </a:p>
         </p:txBody>
       </p:sp>
       <p:pic>
@@ -8856,11 +8302,11 @@
           <p:nvPr/>
         </p:nvPicPr>
         <p:blipFill>
-          <a:blip r:embed="rId4">
+          <a:blip r:embed="rId5">
             <a:extLst>
               <a:ext uri="{BEBA8EAE-BF5A-486C-A8C5-ECC9F3942E4B}">
                 <a14:imgProps xmlns:a14="http://schemas.microsoft.com/office/drawing/2010/main">
-                  <a14:imgLayer r:embed="rId5">
+                  <a14:imgLayer r:embed="rId6">
                     <a14:imgEffect>
                       <a14:backgroundRemoval t="0" b="98889" l="0" r="95833">
                         <a14:foregroundMark x1="45839" y1="21123" x2="65864" y2="34817"/>
@@ -8991,7 +8437,7 @@
 </p:sld>
 </file>
 
-<file path=ppt/slides/slide17.xml><?xml version="1.0" encoding="utf-8"?>
+<file path=ppt/slides/slide15.xml><?xml version="1.0" encoding="utf-8"?>
 <p:sld xmlns:a="http://schemas.openxmlformats.org/drawingml/2006/main" xmlns:r="http://schemas.openxmlformats.org/officeDocument/2006/relationships" xmlns:p="http://schemas.openxmlformats.org/presentationml/2006/main">
   <p:cSld>
     <p:spTree>
@@ -9193,7 +8639,7 @@
 </p:sld>
 </file>
 
-<file path=ppt/slides/slide18.xml><?xml version="1.0" encoding="utf-8"?>
+<file path=ppt/slides/slide16.xml><?xml version="1.0" encoding="utf-8"?>
 <p:sld xmlns:a="http://schemas.openxmlformats.org/drawingml/2006/main" xmlns:r="http://schemas.openxmlformats.org/officeDocument/2006/relationships" xmlns:p="http://schemas.openxmlformats.org/presentationml/2006/main">
   <p:cSld>
     <p:bg>
@@ -9627,7 +9073,7 @@
             <a:pPr lvl="1"/>
             <a:r>
               <a:rPr lang="fr-CA" dirty="0"/>
-              <a:t>Création: début 1990 aux Pays-Bas</a:t>
+              <a:t>Création: début 1990 aux Pays-Bas avec la version 0.9.0</a:t>
             </a:r>
           </a:p>
           <a:p>
@@ -9644,47 +9090,67 @@
           </a:p>
           <a:p>
             <a:pPr lvl="1"/>
+            <a:r>
+              <a:rPr lang="fr-CA" dirty="0"/>
+              <a:t>Version actuel: 3.11.3</a:t>
+            </a:r>
+          </a:p>
+          <a:p>
+            <a:pPr lvl="1"/>
+            <a:r>
+              <a:rPr lang="fr-CA" dirty="0"/>
+              <a:t>Version en développement: 3.12.0a7</a:t>
+            </a:r>
+          </a:p>
+          <a:p>
+            <a:pPr lvl="1"/>
+            <a:r>
+              <a:rPr lang="fr-CA" dirty="0"/>
+              <a:t>Langage open source</a:t>
+            </a:r>
+          </a:p>
+          <a:p>
+            <a:pPr lvl="1"/>
+            <a:r>
+              <a:rPr lang="fr-CA" dirty="0"/>
+              <a:t>Langage influencé par: ABC, C, Eiffel, ICON, Modula-r, Java, Perl, </a:t>
+            </a:r>
+            <a:r>
+              <a:rPr lang="fr-CA" dirty="0" err="1"/>
+              <a:t>Smalltalk</a:t>
+            </a:r>
+            <a:r>
+              <a:rPr lang="fr-CA" dirty="0"/>
+              <a:t> et </a:t>
+            </a:r>
+            <a:r>
+              <a:rPr lang="fr-CA" dirty="0" err="1"/>
+              <a:t>Tcl</a:t>
+            </a:r>
             <a:endParaRPr lang="fr-CA" dirty="0"/>
           </a:p>
           <a:p>
+            <a:pPr lvl="1"/>
             <a:r>
               <a:rPr lang="fr-CA" dirty="0"/>
-              <a:t>Utilisé par:</a:t>
+              <a:t>Langage qui a </a:t>
+            </a:r>
+            <a:r>
+              <a:rPr lang="fr-CA" dirty="0" err="1"/>
+              <a:t>influancé</a:t>
+            </a:r>
+            <a:r>
+              <a:rPr lang="fr-CA" dirty="0"/>
+              <a:t>: Ruby, Groovy, Boo et Julia</a:t>
             </a:r>
           </a:p>
           <a:p>
             <a:pPr lvl="1"/>
-            <a:r>
-              <a:rPr lang="fr-CA" dirty="0"/>
-              <a:t>Google = web </a:t>
-            </a:r>
-            <a:r>
-              <a:rPr lang="fr-CA" dirty="0" err="1"/>
-              <a:t>search</a:t>
-            </a:r>
-            <a:r>
-              <a:rPr lang="fr-CA" dirty="0"/>
-              <a:t> system</a:t>
-            </a:r>
+            <a:endParaRPr lang="fr-CA" dirty="0"/>
           </a:p>
           <a:p>
             <a:pPr lvl="1"/>
-            <a:r>
-              <a:rPr lang="fr-CA" dirty="0"/>
-              <a:t>Intel, Cisco, HP, Seagate, Qualcomm, IBM = hardware </a:t>
-            </a:r>
-            <a:r>
-              <a:rPr lang="fr-CA" dirty="0" err="1"/>
-              <a:t>testing</a:t>
-            </a:r>
             <a:endParaRPr lang="fr-CA" dirty="0"/>
-          </a:p>
-          <a:p>
-            <a:pPr lvl="1"/>
-            <a:r>
-              <a:rPr lang="fr-CA" dirty="0"/>
-              <a:t>Uber, PayPal, Netflix, YouTube, Facebook, la NASA et plusieurs autres gros noms</a:t>
-            </a:r>
           </a:p>
           <a:p>
             <a:pPr lvl="1"/>
@@ -9886,6 +9352,276 @@
           <a:p>
             <a:r>
               <a:rPr lang="fr-CA" dirty="0"/>
+              <a:t>Introduction (suite)</a:t>
+            </a:r>
+          </a:p>
+        </p:txBody>
+      </p:sp>
+      <p:sp>
+        <p:nvSpPr>
+          <p:cNvPr id="3" name="Content Placeholder 2">
+            <a:extLst>
+              <a:ext uri="{FF2B5EF4-FFF2-40B4-BE49-F238E27FC236}">
+                <a16:creationId xmlns:a16="http://schemas.microsoft.com/office/drawing/2014/main" id="{373CD124-A220-8948-8B26-60E0C8147A18}"/>
+              </a:ext>
+            </a:extLst>
+          </p:cNvPr>
+          <p:cNvSpPr>
+            <a:spLocks noGrp="1"/>
+          </p:cNvSpPr>
+          <p:nvPr>
+            <p:ph idx="1"/>
+          </p:nvPr>
+        </p:nvSpPr>
+        <p:spPr>
+          <a:xfrm>
+            <a:off x="1103312" y="2052918"/>
+            <a:ext cx="8946541" cy="4352364"/>
+          </a:xfrm>
+        </p:spPr>
+        <p:txBody>
+          <a:bodyPr/>
+          <a:lstStyle/>
+          <a:p>
+            <a:r>
+              <a:rPr lang="fr-CA" dirty="0"/>
+              <a:t>Utilisé par:</a:t>
+            </a:r>
+          </a:p>
+          <a:p>
+            <a:pPr lvl="1"/>
+            <a:r>
+              <a:rPr lang="fr-CA" dirty="0"/>
+              <a:t>Google = web </a:t>
+            </a:r>
+            <a:r>
+              <a:rPr lang="fr-CA" dirty="0" err="1"/>
+              <a:t>search</a:t>
+            </a:r>
+            <a:r>
+              <a:rPr lang="fr-CA" dirty="0"/>
+              <a:t> system</a:t>
+            </a:r>
+          </a:p>
+          <a:p>
+            <a:pPr lvl="1"/>
+            <a:r>
+              <a:rPr lang="fr-CA" dirty="0"/>
+              <a:t>Intel, Cisco, HP, Seagate, Qualcomm, IBM = hardware </a:t>
+            </a:r>
+            <a:r>
+              <a:rPr lang="fr-CA" dirty="0" err="1"/>
+              <a:t>testing</a:t>
+            </a:r>
+            <a:endParaRPr lang="fr-CA" dirty="0"/>
+          </a:p>
+          <a:p>
+            <a:pPr lvl="1"/>
+            <a:r>
+              <a:rPr lang="fr-CA" dirty="0"/>
+              <a:t>Uber, PayPal, Netflix, YouTube, Facebook, la NASA et plusieurs autres gros noms</a:t>
+            </a:r>
+          </a:p>
+          <a:p>
+            <a:pPr lvl="1"/>
+            <a:endParaRPr lang="fr-CA" dirty="0"/>
+          </a:p>
+          <a:p>
+            <a:pPr lvl="1"/>
+            <a:endParaRPr lang="fr-CA" dirty="0"/>
+          </a:p>
+        </p:txBody>
+      </p:sp>
+      <p:pic>
+        <p:nvPicPr>
+          <p:cNvPr id="4" name="Picture 3" descr="Icon&#10;&#10;Description automatically generated">
+            <a:extLst>
+              <a:ext uri="{FF2B5EF4-FFF2-40B4-BE49-F238E27FC236}">
+                <a16:creationId xmlns:a16="http://schemas.microsoft.com/office/drawing/2014/main" id="{97A2B96C-D03E-8CE9-FA7A-95DB981248F9}"/>
+              </a:ext>
+            </a:extLst>
+          </p:cNvPr>
+          <p:cNvPicPr>
+            <a:picLocks noChangeAspect="1"/>
+          </p:cNvPicPr>
+          <p:nvPr/>
+        </p:nvPicPr>
+        <p:blipFill>
+          <a:blip r:embed="rId2">
+            <a:extLst>
+              <a:ext uri="{BEBA8EAE-BF5A-486C-A8C5-ECC9F3942E4B}">
+                <a14:imgProps xmlns:a14="http://schemas.microsoft.com/office/drawing/2010/main">
+                  <a14:imgLayer r:embed="rId3">
+                    <a14:imgEffect>
+                      <a14:backgroundRemoval t="0" b="98889" l="0" r="95833">
+                        <a14:foregroundMark x1="45839" y1="21123" x2="65864" y2="34817"/>
+                        <a14:foregroundMark x1="37451" y1="15387" x2="38997" y2="16444"/>
+                        <a14:foregroundMark x1="65773" y1="33981" x2="65556" y2="38056"/>
+                        <a14:foregroundMark x1="66672" y1="17060" x2="66005" y2="29601"/>
+                        <a14:foregroundMark x1="65970" y1="35791" x2="48219" y2="46292"/>
+                        <a14:foregroundMark x1="43975" y1="34426" x2="11944" y2="52500"/>
+                        <a14:foregroundMark x1="11944" y1="52500" x2="26713" y2="65767"/>
+                        <a14:foregroundMark x1="45981" y1="54263" x2="37423" y2="59567"/>
+                        <a14:foregroundMark x1="63414" y1="43459" x2="55659" y2="48265"/>
+                        <a14:foregroundMark x1="64146" y1="45021" x2="62830" y2="46337"/>
+                        <a14:foregroundMark x1="64840" y1="41320" x2="47508" y2="46292"/>
+                        <a14:foregroundMark x1="65029" y1="50884" x2="63333" y2="55278"/>
+                        <a14:foregroundMark x1="61522" y1="86384" x2="67510" y2="80163"/>
+                        <a14:foregroundMark x1="52500" y1="36111" x2="49722" y2="31944"/>
+                        <a14:foregroundMark x1="55556" y1="33056" x2="43056" y2="32778"/>
+                        <a14:foregroundMark x1="41944" y1="15833" x2="46389" y2="20833"/>
+                        <a14:foregroundMark x1="43611" y1="11944" x2="59167" y2="12500"/>
+                        <a14:foregroundMark x1="67222" y1="18889" x2="67469" y2="38855"/>
+                        <a14:foregroundMark x1="38611" y1="47500" x2="29167" y2="52778"/>
+                        <a14:foregroundMark x1="33133" y1="56389" x2="33611" y2="70278"/>
+                        <a14:foregroundMark x1="33105" y1="55556" x2="33133" y2="56389"/>
+                        <a14:foregroundMark x1="33094" y1="55248" x2="33105" y2="55556"/>
+                        <a14:foregroundMark x1="36667" y1="67778" x2="38611" y2="63333"/>
+                        <a14:foregroundMark x1="38611" y1="65278" x2="57500" y2="55000"/>
+                        <a14:foregroundMark x1="39722" y1="61667" x2="36389" y2="67500"/>
+                        <a14:foregroundMark x1="55833" y1="73056" x2="63889" y2="75000"/>
+                        <a14:foregroundMark x1="46667" y1="68056" x2="50618" y2="69444"/>
+                        <a14:foregroundMark x1="53333" y1="53056" x2="67500" y2="52222"/>
+                        <a14:foregroundMark x1="71074" y1="40975" x2="71111" y2="40556"/>
+                        <a14:foregroundMark x1="70278" y1="50000" x2="70393" y2="48694"/>
+                        <a14:foregroundMark x1="72222" y1="41111" x2="71944" y2="40278"/>
+                        <a14:foregroundMark x1="72445" y1="41781" x2="72222" y2="41111"/>
+                        <a14:foregroundMark x1="74444" y1="47778" x2="73587" y2="45206"/>
+                        <a14:foregroundMark x1="68156" y1="47379" x2="67222" y2="48611"/>
+                        <a14:foregroundMark x1="72904" y1="41111" x2="72411" y2="41761"/>
+                        <a14:foregroundMark x1="74167" y1="39444" x2="72904" y2="41111"/>
+                        <a14:foregroundMark x1="72778" y1="31944" x2="80000" y2="33333"/>
+                        <a14:foregroundMark x1="33333" y1="55000" x2="33333" y2="55000"/>
+                        <a14:foregroundMark x1="33333" y1="55556" x2="33333" y2="55556"/>
+                        <a14:foregroundMark x1="33889" y1="55556" x2="32785" y2="55924"/>
+                        <a14:foregroundMark x1="50278" y1="69167" x2="51471" y2="69316"/>
+                        <a14:backgroundMark x1="13611" y1="8056" x2="15000" y2="12500"/>
+                        <a14:backgroundMark x1="20833" y1="8333" x2="15833" y2="24444"/>
+                        <a14:backgroundMark x1="26111" y1="8889" x2="25278" y2="26389"/>
+                        <a14:backgroundMark x1="20556" y1="1667" x2="83333" y2="1111"/>
+                        <a14:backgroundMark x1="83333" y1="1111" x2="98056" y2="1667"/>
+                        <a14:backgroundMark x1="96667" y1="5000" x2="9167" y2="5278"/>
+                        <a14:backgroundMark x1="278" y1="833" x2="1111" y2="48333"/>
+                        <a14:backgroundMark x1="1111" y1="48333" x2="1667" y2="49722"/>
+                        <a14:backgroundMark x1="556" y1="833" x2="16389" y2="14444"/>
+                        <a14:backgroundMark x1="10000" y1="10000" x2="3333" y2="16667"/>
+                        <a14:backgroundMark x1="33611" y1="11389" x2="33611" y2="11389"/>
+                        <a14:backgroundMark x1="39167" y1="10000" x2="39167" y2="10000"/>
+                        <a14:backgroundMark x1="33889" y1="9444" x2="29167" y2="11111"/>
+                        <a14:backgroundMark x1="40556" y1="8889" x2="29444" y2="14167"/>
+                        <a14:backgroundMark x1="35833" y1="9722" x2="30278" y2="16111"/>
+                        <a14:backgroundMark x1="30278" y1="16667" x2="29722" y2="26944"/>
+                        <a14:backgroundMark x1="21389" y1="29722" x2="41510" y2="30314"/>
+                        <a14:backgroundMark x1="28611" y1="15000" x2="31389" y2="18611"/>
+                        <a14:backgroundMark x1="278" y1="28889" x2="2500" y2="99444"/>
+                        <a14:backgroundMark x1="10000" y1="99722" x2="53056" y2="98611"/>
+                        <a14:backgroundMark x1="69444" y1="95278" x2="49444" y2="97222"/>
+                        <a14:backgroundMark x1="66667" y1="91389" x2="48889" y2="93056"/>
+                        <a14:backgroundMark x1="63056" y1="88056" x2="56667" y2="91389"/>
+                        <a14:backgroundMark x1="69722" y1="73333" x2="73889" y2="83056"/>
+                        <a14:backgroundMark x1="63056" y1="77500" x2="63056" y2="79167"/>
+                        <a14:backgroundMark x1="60183" y1="78569" x2="60000" y2="78889"/>
+                        <a14:backgroundMark x1="82500" y1="70000" x2="60884" y2="69810"/>
+                        <a14:backgroundMark x1="64029" y1="48545" x2="65574" y2="47542"/>
+                        <a14:backgroundMark x1="68678" y1="18871" x2="68889" y2="12500"/>
+                        <a14:backgroundMark x1="55038" y1="50278" x2="41229" y2="50278"/>
+                        <a14:backgroundMark x1="30687" y1="70379" x2="30556" y2="71111"/>
+                        <a14:backgroundMark x1="69722" y1="10000" x2="74718" y2="29266"/>
+                        <a14:backgroundMark x1="82565" y1="29791" x2="92778" y2="40556"/>
+                        <a14:backgroundMark x1="72222" y1="18889" x2="82189" y2="29395"/>
+                        <a14:backgroundMark x1="89444" y1="35278" x2="92222" y2="68889"/>
+                        <a14:backgroundMark x1="95556" y1="41667" x2="98056" y2="92222"/>
+                        <a14:backgroundMark x1="98333" y1="80000" x2="98056" y2="98056"/>
+                        <a14:backgroundMark x1="96944" y1="90833" x2="64444" y2="95278"/>
+                        <a14:backgroundMark x1="44390" y1="10748" x2="33611" y2="10556"/>
+                        <a14:backgroundMark x1="64722" y1="11111" x2="60125" y2="11029"/>
+                        <a14:backgroundMark x1="59830" y1="11482" x2="75833" y2="13889"/>
+                        <a14:backgroundMark x1="44444" y1="9167" x2="45333" y2="9301"/>
+                        <a14:backgroundMark x1="37500" y1="20000" x2="39569" y2="20239"/>
+                        <a14:backgroundMark x1="55272" y1="49896" x2="47778" y2="50833"/>
+                        <a14:backgroundMark x1="70278" y1="41111" x2="70278" y2="41111"/>
+                        <a14:backgroundMark x1="70833" y1="40833" x2="66944" y2="46667"/>
+                        <a14:backgroundMark x1="56111" y1="70000" x2="51944" y2="70556"/>
+                        <a14:backgroundMark x1="32778" y1="55000" x2="32778" y2="55000"/>
+                        <a14:backgroundMark x1="32222" y1="56389" x2="32222" y2="56389"/>
+                        <a14:backgroundMark x1="31389" y1="56111" x2="33333" y2="54722"/>
+                        <a14:backgroundMark x1="32500" y1="55556" x2="32500" y2="55556"/>
+                        <a14:backgroundMark x1="51111" y1="69444" x2="51111" y2="69444"/>
+                        <a14:backgroundMark x1="51389" y1="69444" x2="52778" y2="69444"/>
+                      </a14:backgroundRemoval>
+                    </a14:imgEffect>
+                  </a14:imgLayer>
+                </a14:imgProps>
+              </a:ext>
+            </a:extLst>
+          </a:blip>
+          <a:stretch>
+            <a:fillRect/>
+          </a:stretch>
+        </p:blipFill>
+        <p:spPr>
+          <a:xfrm>
+            <a:off x="11086306" y="0"/>
+            <a:ext cx="1143000" cy="1143000"/>
+          </a:xfrm>
+          <a:prstGeom prst="rect">
+            <a:avLst/>
+          </a:prstGeom>
+        </p:spPr>
+      </p:pic>
+    </p:spTree>
+    <p:extLst>
+      <p:ext uri="{BB962C8B-B14F-4D97-AF65-F5344CB8AC3E}">
+        <p14:creationId xmlns:p14="http://schemas.microsoft.com/office/powerpoint/2010/main" val="3212434131"/>
+      </p:ext>
+    </p:extLst>
+  </p:cSld>
+  <p:clrMapOvr>
+    <a:masterClrMapping/>
+  </p:clrMapOvr>
+</p:sld>
+</file>
+
+<file path=ppt/slides/slide4.xml><?xml version="1.0" encoding="utf-8"?>
+<p:sld xmlns:a="http://schemas.openxmlformats.org/drawingml/2006/main" xmlns:r="http://schemas.openxmlformats.org/officeDocument/2006/relationships" xmlns:p="http://schemas.openxmlformats.org/presentationml/2006/main">
+  <p:cSld>
+    <p:spTree>
+      <p:nvGrpSpPr>
+        <p:cNvPr id="1" name=""/>
+        <p:cNvGrpSpPr/>
+        <p:nvPr/>
+      </p:nvGrpSpPr>
+      <p:grpSpPr>
+        <a:xfrm>
+          <a:off x="0" y="0"/>
+          <a:ext cx="0" cy="0"/>
+          <a:chOff x="0" y="0"/>
+          <a:chExt cx="0" cy="0"/>
+        </a:xfrm>
+      </p:grpSpPr>
+      <p:sp>
+        <p:nvSpPr>
+          <p:cNvPr id="2" name="Title 1">
+            <a:extLst>
+              <a:ext uri="{FF2B5EF4-FFF2-40B4-BE49-F238E27FC236}">
+                <a16:creationId xmlns:a16="http://schemas.microsoft.com/office/drawing/2014/main" id="{EAB1E08A-0123-7F64-56DB-EA6B2845C34A}"/>
+              </a:ext>
+            </a:extLst>
+          </p:cNvPr>
+          <p:cNvSpPr>
+            <a:spLocks noGrp="1"/>
+          </p:cNvSpPr>
+          <p:nvPr>
+            <p:ph type="title"/>
+          </p:nvPr>
+        </p:nvSpPr>
+        <p:spPr/>
+        <p:txBody>
+          <a:bodyPr/>
+          <a:lstStyle/>
+          <a:p>
+            <a:r>
+              <a:rPr lang="fr-CA" dirty="0"/>
               <a:t>Caractéristiques du langage</a:t>
             </a:r>
           </a:p>
@@ -10093,7 +9829,501 @@
 </p:sld>
 </file>
 
-<file path=ppt/slides/slide4.xml><?xml version="1.0" encoding="utf-8"?>
+<file path=ppt/slides/slide5.xml><?xml version="1.0" encoding="utf-8"?>
+<p:sld xmlns:a="http://schemas.openxmlformats.org/drawingml/2006/main" xmlns:r="http://schemas.openxmlformats.org/officeDocument/2006/relationships" xmlns:p="http://schemas.openxmlformats.org/presentationml/2006/main">
+  <p:cSld>
+    <p:spTree>
+      <p:nvGrpSpPr>
+        <p:cNvPr id="1" name=""/>
+        <p:cNvGrpSpPr/>
+        <p:nvPr/>
+      </p:nvGrpSpPr>
+      <p:grpSpPr>
+        <a:xfrm>
+          <a:off x="0" y="0"/>
+          <a:ext cx="0" cy="0"/>
+          <a:chOff x="0" y="0"/>
+          <a:chExt cx="0" cy="0"/>
+        </a:xfrm>
+      </p:grpSpPr>
+      <p:sp>
+        <p:nvSpPr>
+          <p:cNvPr id="2" name="Title 1">
+            <a:extLst>
+              <a:ext uri="{FF2B5EF4-FFF2-40B4-BE49-F238E27FC236}">
+                <a16:creationId xmlns:a16="http://schemas.microsoft.com/office/drawing/2014/main" id="{EAB1E08A-0123-7F64-56DB-EA6B2845C34A}"/>
+              </a:ext>
+            </a:extLst>
+          </p:cNvPr>
+          <p:cNvSpPr>
+            <a:spLocks noGrp="1"/>
+          </p:cNvSpPr>
+          <p:nvPr>
+            <p:ph type="title"/>
+          </p:nvPr>
+        </p:nvSpPr>
+        <p:spPr/>
+        <p:txBody>
+          <a:bodyPr/>
+          <a:lstStyle/>
+          <a:p>
+            <a:r>
+              <a:rPr lang="fr-CA" dirty="0"/>
+              <a:t>Les avantages de Python</a:t>
+            </a:r>
+          </a:p>
+        </p:txBody>
+      </p:sp>
+      <p:sp>
+        <p:nvSpPr>
+          <p:cNvPr id="3" name="Content Placeholder 2">
+            <a:extLst>
+              <a:ext uri="{FF2B5EF4-FFF2-40B4-BE49-F238E27FC236}">
+                <a16:creationId xmlns:a16="http://schemas.microsoft.com/office/drawing/2014/main" id="{373CD124-A220-8948-8B26-60E0C8147A18}"/>
+              </a:ext>
+            </a:extLst>
+          </p:cNvPr>
+          <p:cNvSpPr>
+            <a:spLocks noGrp="1"/>
+          </p:cNvSpPr>
+          <p:nvPr>
+            <p:ph idx="1"/>
+          </p:nvPr>
+        </p:nvSpPr>
+        <p:spPr/>
+        <p:txBody>
+          <a:bodyPr/>
+          <a:lstStyle/>
+          <a:p>
+            <a:r>
+              <a:rPr lang="fr-CA" dirty="0"/>
+              <a:t>Facile à apprendre</a:t>
+            </a:r>
+          </a:p>
+          <a:p>
+            <a:r>
+              <a:rPr lang="fr-CA" dirty="0"/>
+              <a:t>Grand communauté</a:t>
+            </a:r>
+          </a:p>
+          <a:p>
+            <a:r>
+              <a:rPr lang="fr-CA" dirty="0"/>
+              <a:t>Multiplateforme</a:t>
+            </a:r>
+          </a:p>
+          <a:p>
+            <a:r>
+              <a:rPr lang="fr-CA" dirty="0"/>
+              <a:t>Large bibliothèque</a:t>
+            </a:r>
+          </a:p>
+          <a:p>
+            <a:r>
+              <a:rPr lang="fr-CA" dirty="0"/>
+              <a:t>Orienté objet</a:t>
+            </a:r>
+          </a:p>
+        </p:txBody>
+      </p:sp>
+      <p:pic>
+        <p:nvPicPr>
+          <p:cNvPr id="4" name="Picture 3" descr="Icon&#10;&#10;Description automatically generated">
+            <a:extLst>
+              <a:ext uri="{FF2B5EF4-FFF2-40B4-BE49-F238E27FC236}">
+                <a16:creationId xmlns:a16="http://schemas.microsoft.com/office/drawing/2014/main" id="{97A2B96C-D03E-8CE9-FA7A-95DB981248F9}"/>
+              </a:ext>
+            </a:extLst>
+          </p:cNvPr>
+          <p:cNvPicPr>
+            <a:picLocks noChangeAspect="1"/>
+          </p:cNvPicPr>
+          <p:nvPr/>
+        </p:nvPicPr>
+        <p:blipFill>
+          <a:blip r:embed="rId2">
+            <a:extLst>
+              <a:ext uri="{BEBA8EAE-BF5A-486C-A8C5-ECC9F3942E4B}">
+                <a14:imgProps xmlns:a14="http://schemas.microsoft.com/office/drawing/2010/main">
+                  <a14:imgLayer r:embed="rId3">
+                    <a14:imgEffect>
+                      <a14:backgroundRemoval t="0" b="98889" l="0" r="95833">
+                        <a14:foregroundMark x1="45839" y1="21123" x2="65864" y2="34817"/>
+                        <a14:foregroundMark x1="37451" y1="15387" x2="38997" y2="16444"/>
+                        <a14:foregroundMark x1="65773" y1="33981" x2="65556" y2="38056"/>
+                        <a14:foregroundMark x1="66672" y1="17060" x2="66005" y2="29601"/>
+                        <a14:foregroundMark x1="65970" y1="35791" x2="48219" y2="46292"/>
+                        <a14:foregroundMark x1="43975" y1="34426" x2="11944" y2="52500"/>
+                        <a14:foregroundMark x1="11944" y1="52500" x2="26713" y2="65767"/>
+                        <a14:foregroundMark x1="45981" y1="54263" x2="37423" y2="59567"/>
+                        <a14:foregroundMark x1="63414" y1="43459" x2="55659" y2="48265"/>
+                        <a14:foregroundMark x1="64146" y1="45021" x2="62830" y2="46337"/>
+                        <a14:foregroundMark x1="64840" y1="41320" x2="47508" y2="46292"/>
+                        <a14:foregroundMark x1="65029" y1="50884" x2="63333" y2="55278"/>
+                        <a14:foregroundMark x1="61522" y1="86384" x2="67510" y2="80163"/>
+                        <a14:foregroundMark x1="52500" y1="36111" x2="49722" y2="31944"/>
+                        <a14:foregroundMark x1="55556" y1="33056" x2="43056" y2="32778"/>
+                        <a14:foregroundMark x1="41944" y1="15833" x2="46389" y2="20833"/>
+                        <a14:foregroundMark x1="43611" y1="11944" x2="59167" y2="12500"/>
+                        <a14:foregroundMark x1="67222" y1="18889" x2="67469" y2="38855"/>
+                        <a14:foregroundMark x1="38611" y1="47500" x2="29167" y2="52778"/>
+                        <a14:foregroundMark x1="33133" y1="56389" x2="33611" y2="70278"/>
+                        <a14:foregroundMark x1="33105" y1="55556" x2="33133" y2="56389"/>
+                        <a14:foregroundMark x1="33094" y1="55248" x2="33105" y2="55556"/>
+                        <a14:foregroundMark x1="36667" y1="67778" x2="38611" y2="63333"/>
+                        <a14:foregroundMark x1="38611" y1="65278" x2="57500" y2="55000"/>
+                        <a14:foregroundMark x1="39722" y1="61667" x2="36389" y2="67500"/>
+                        <a14:foregroundMark x1="55833" y1="73056" x2="63889" y2="75000"/>
+                        <a14:foregroundMark x1="46667" y1="68056" x2="50618" y2="69444"/>
+                        <a14:foregroundMark x1="53333" y1="53056" x2="67500" y2="52222"/>
+                        <a14:foregroundMark x1="71074" y1="40975" x2="71111" y2="40556"/>
+                        <a14:foregroundMark x1="70278" y1="50000" x2="70393" y2="48694"/>
+                        <a14:foregroundMark x1="72222" y1="41111" x2="71944" y2="40278"/>
+                        <a14:foregroundMark x1="72445" y1="41781" x2="72222" y2="41111"/>
+                        <a14:foregroundMark x1="74444" y1="47778" x2="73587" y2="45206"/>
+                        <a14:foregroundMark x1="68156" y1="47379" x2="67222" y2="48611"/>
+                        <a14:foregroundMark x1="72904" y1="41111" x2="72411" y2="41761"/>
+                        <a14:foregroundMark x1="74167" y1="39444" x2="72904" y2="41111"/>
+                        <a14:foregroundMark x1="72778" y1="31944" x2="80000" y2="33333"/>
+                        <a14:foregroundMark x1="33333" y1="55000" x2="33333" y2="55000"/>
+                        <a14:foregroundMark x1="33333" y1="55556" x2="33333" y2="55556"/>
+                        <a14:foregroundMark x1="33889" y1="55556" x2="32785" y2="55924"/>
+                        <a14:foregroundMark x1="50278" y1="69167" x2="51471" y2="69316"/>
+                        <a14:backgroundMark x1="13611" y1="8056" x2="15000" y2="12500"/>
+                        <a14:backgroundMark x1="20833" y1="8333" x2="15833" y2="24444"/>
+                        <a14:backgroundMark x1="26111" y1="8889" x2="25278" y2="26389"/>
+                        <a14:backgroundMark x1="20556" y1="1667" x2="83333" y2="1111"/>
+                        <a14:backgroundMark x1="83333" y1="1111" x2="98056" y2="1667"/>
+                        <a14:backgroundMark x1="96667" y1="5000" x2="9167" y2="5278"/>
+                        <a14:backgroundMark x1="278" y1="833" x2="1111" y2="48333"/>
+                        <a14:backgroundMark x1="1111" y1="48333" x2="1667" y2="49722"/>
+                        <a14:backgroundMark x1="556" y1="833" x2="16389" y2="14444"/>
+                        <a14:backgroundMark x1="10000" y1="10000" x2="3333" y2="16667"/>
+                        <a14:backgroundMark x1="33611" y1="11389" x2="33611" y2="11389"/>
+                        <a14:backgroundMark x1="39167" y1="10000" x2="39167" y2="10000"/>
+                        <a14:backgroundMark x1="33889" y1="9444" x2="29167" y2="11111"/>
+                        <a14:backgroundMark x1="40556" y1="8889" x2="29444" y2="14167"/>
+                        <a14:backgroundMark x1="35833" y1="9722" x2="30278" y2="16111"/>
+                        <a14:backgroundMark x1="30278" y1="16667" x2="29722" y2="26944"/>
+                        <a14:backgroundMark x1="21389" y1="29722" x2="41510" y2="30314"/>
+                        <a14:backgroundMark x1="28611" y1="15000" x2="31389" y2="18611"/>
+                        <a14:backgroundMark x1="278" y1="28889" x2="2500" y2="99444"/>
+                        <a14:backgroundMark x1="10000" y1="99722" x2="53056" y2="98611"/>
+                        <a14:backgroundMark x1="69444" y1="95278" x2="49444" y2="97222"/>
+                        <a14:backgroundMark x1="66667" y1="91389" x2="48889" y2="93056"/>
+                        <a14:backgroundMark x1="63056" y1="88056" x2="56667" y2="91389"/>
+                        <a14:backgroundMark x1="69722" y1="73333" x2="73889" y2="83056"/>
+                        <a14:backgroundMark x1="63056" y1="77500" x2="63056" y2="79167"/>
+                        <a14:backgroundMark x1="60183" y1="78569" x2="60000" y2="78889"/>
+                        <a14:backgroundMark x1="82500" y1="70000" x2="60884" y2="69810"/>
+                        <a14:backgroundMark x1="64029" y1="48545" x2="65574" y2="47542"/>
+                        <a14:backgroundMark x1="68678" y1="18871" x2="68889" y2="12500"/>
+                        <a14:backgroundMark x1="55038" y1="50278" x2="41229" y2="50278"/>
+                        <a14:backgroundMark x1="30687" y1="70379" x2="30556" y2="71111"/>
+                        <a14:backgroundMark x1="69722" y1="10000" x2="74718" y2="29266"/>
+                        <a14:backgroundMark x1="82565" y1="29791" x2="92778" y2="40556"/>
+                        <a14:backgroundMark x1="72222" y1="18889" x2="82189" y2="29395"/>
+                        <a14:backgroundMark x1="89444" y1="35278" x2="92222" y2="68889"/>
+                        <a14:backgroundMark x1="95556" y1="41667" x2="98056" y2="92222"/>
+                        <a14:backgroundMark x1="98333" y1="80000" x2="98056" y2="98056"/>
+                        <a14:backgroundMark x1="96944" y1="90833" x2="64444" y2="95278"/>
+                        <a14:backgroundMark x1="44390" y1="10748" x2="33611" y2="10556"/>
+                        <a14:backgroundMark x1="64722" y1="11111" x2="60125" y2="11029"/>
+                        <a14:backgroundMark x1="59830" y1="11482" x2="75833" y2="13889"/>
+                        <a14:backgroundMark x1="44444" y1="9167" x2="45333" y2="9301"/>
+                        <a14:backgroundMark x1="37500" y1="20000" x2="39569" y2="20239"/>
+                        <a14:backgroundMark x1="55272" y1="49896" x2="47778" y2="50833"/>
+                        <a14:backgroundMark x1="70278" y1="41111" x2="70278" y2="41111"/>
+                        <a14:backgroundMark x1="70833" y1="40833" x2="66944" y2="46667"/>
+                        <a14:backgroundMark x1="56111" y1="70000" x2="51944" y2="70556"/>
+                        <a14:backgroundMark x1="32778" y1="55000" x2="32778" y2="55000"/>
+                        <a14:backgroundMark x1="32222" y1="56389" x2="32222" y2="56389"/>
+                        <a14:backgroundMark x1="31389" y1="56111" x2="33333" y2="54722"/>
+                        <a14:backgroundMark x1="32500" y1="55556" x2="32500" y2="55556"/>
+                        <a14:backgroundMark x1="51111" y1="69444" x2="51111" y2="69444"/>
+                        <a14:backgroundMark x1="51389" y1="69444" x2="52778" y2="69444"/>
+                      </a14:backgroundRemoval>
+                    </a14:imgEffect>
+                  </a14:imgLayer>
+                </a14:imgProps>
+              </a:ext>
+            </a:extLst>
+          </a:blip>
+          <a:stretch>
+            <a:fillRect/>
+          </a:stretch>
+        </p:blipFill>
+        <p:spPr>
+          <a:xfrm>
+            <a:off x="11086306" y="0"/>
+            <a:ext cx="1143000" cy="1143000"/>
+          </a:xfrm>
+          <a:prstGeom prst="rect">
+            <a:avLst/>
+          </a:prstGeom>
+        </p:spPr>
+      </p:pic>
+    </p:spTree>
+    <p:extLst>
+      <p:ext uri="{BB962C8B-B14F-4D97-AF65-F5344CB8AC3E}">
+        <p14:creationId xmlns:p14="http://schemas.microsoft.com/office/powerpoint/2010/main" val="1582973841"/>
+      </p:ext>
+    </p:extLst>
+  </p:cSld>
+  <p:clrMapOvr>
+    <a:masterClrMapping/>
+  </p:clrMapOvr>
+</p:sld>
+</file>
+
+<file path=ppt/slides/slide6.xml><?xml version="1.0" encoding="utf-8"?>
+<p:sld xmlns:a="http://schemas.openxmlformats.org/drawingml/2006/main" xmlns:r="http://schemas.openxmlformats.org/officeDocument/2006/relationships" xmlns:p="http://schemas.openxmlformats.org/presentationml/2006/main">
+  <p:cSld>
+    <p:spTree>
+      <p:nvGrpSpPr>
+        <p:cNvPr id="1" name=""/>
+        <p:cNvGrpSpPr/>
+        <p:nvPr/>
+      </p:nvGrpSpPr>
+      <p:grpSpPr>
+        <a:xfrm>
+          <a:off x="0" y="0"/>
+          <a:ext cx="0" cy="0"/>
+          <a:chOff x="0" y="0"/>
+          <a:chExt cx="0" cy="0"/>
+        </a:xfrm>
+      </p:grpSpPr>
+      <p:sp>
+        <p:nvSpPr>
+          <p:cNvPr id="2" name="Title 1">
+            <a:extLst>
+              <a:ext uri="{FF2B5EF4-FFF2-40B4-BE49-F238E27FC236}">
+                <a16:creationId xmlns:a16="http://schemas.microsoft.com/office/drawing/2014/main" id="{EAB1E08A-0123-7F64-56DB-EA6B2845C34A}"/>
+              </a:ext>
+            </a:extLst>
+          </p:cNvPr>
+          <p:cNvSpPr>
+            <a:spLocks noGrp="1"/>
+          </p:cNvSpPr>
+          <p:nvPr>
+            <p:ph type="title"/>
+          </p:nvPr>
+        </p:nvSpPr>
+        <p:spPr/>
+        <p:txBody>
+          <a:bodyPr/>
+          <a:lstStyle/>
+          <a:p>
+            <a:r>
+              <a:rPr lang="fr-CA" dirty="0"/>
+              <a:t>Les désavantages de Python</a:t>
+            </a:r>
+          </a:p>
+        </p:txBody>
+      </p:sp>
+      <p:sp>
+        <p:nvSpPr>
+          <p:cNvPr id="3" name="Content Placeholder 2">
+            <a:extLst>
+              <a:ext uri="{FF2B5EF4-FFF2-40B4-BE49-F238E27FC236}">
+                <a16:creationId xmlns:a16="http://schemas.microsoft.com/office/drawing/2014/main" id="{373CD124-A220-8948-8B26-60E0C8147A18}"/>
+              </a:ext>
+            </a:extLst>
+          </p:cNvPr>
+          <p:cNvSpPr>
+            <a:spLocks noGrp="1"/>
+          </p:cNvSpPr>
+          <p:nvPr>
+            <p:ph idx="1"/>
+          </p:nvPr>
+        </p:nvSpPr>
+        <p:spPr/>
+        <p:txBody>
+          <a:bodyPr/>
+          <a:lstStyle/>
+          <a:p>
+            <a:r>
+              <a:rPr lang="fr-CA" dirty="0"/>
+              <a:t>Performances</a:t>
+            </a:r>
+          </a:p>
+          <a:p>
+            <a:r>
+              <a:rPr lang="fr-CA" dirty="0"/>
+              <a:t>Gestion de la mémoire</a:t>
+            </a:r>
+          </a:p>
+          <a:p>
+            <a:r>
+              <a:rPr lang="fr-CA" dirty="0"/>
+              <a:t>Typage dynamique</a:t>
+            </a:r>
+          </a:p>
+          <a:p>
+            <a:r>
+              <a:rPr lang="fr-CA" dirty="0"/>
+              <a:t>Dépendance aux bibliothèques</a:t>
+            </a:r>
+          </a:p>
+          <a:p>
+            <a:r>
+              <a:rPr lang="fr-CA" dirty="0"/>
+              <a:t>Fragilité des programmes</a:t>
+            </a:r>
+          </a:p>
+        </p:txBody>
+      </p:sp>
+      <p:pic>
+        <p:nvPicPr>
+          <p:cNvPr id="4" name="Picture 3" descr="Icon&#10;&#10;Description automatically generated">
+            <a:extLst>
+              <a:ext uri="{FF2B5EF4-FFF2-40B4-BE49-F238E27FC236}">
+                <a16:creationId xmlns:a16="http://schemas.microsoft.com/office/drawing/2014/main" id="{97A2B96C-D03E-8CE9-FA7A-95DB981248F9}"/>
+              </a:ext>
+            </a:extLst>
+          </p:cNvPr>
+          <p:cNvPicPr>
+            <a:picLocks noChangeAspect="1"/>
+          </p:cNvPicPr>
+          <p:nvPr/>
+        </p:nvPicPr>
+        <p:blipFill>
+          <a:blip r:embed="rId2">
+            <a:extLst>
+              <a:ext uri="{BEBA8EAE-BF5A-486C-A8C5-ECC9F3942E4B}">
+                <a14:imgProps xmlns:a14="http://schemas.microsoft.com/office/drawing/2010/main">
+                  <a14:imgLayer r:embed="rId3">
+                    <a14:imgEffect>
+                      <a14:backgroundRemoval t="0" b="98889" l="0" r="95833">
+                        <a14:foregroundMark x1="45839" y1="21123" x2="65864" y2="34817"/>
+                        <a14:foregroundMark x1="37451" y1="15387" x2="38997" y2="16444"/>
+                        <a14:foregroundMark x1="65773" y1="33981" x2="65556" y2="38056"/>
+                        <a14:foregroundMark x1="66672" y1="17060" x2="66005" y2="29601"/>
+                        <a14:foregroundMark x1="65970" y1="35791" x2="48219" y2="46292"/>
+                        <a14:foregroundMark x1="43975" y1="34426" x2="11944" y2="52500"/>
+                        <a14:foregroundMark x1="11944" y1="52500" x2="26713" y2="65767"/>
+                        <a14:foregroundMark x1="45981" y1="54263" x2="37423" y2="59567"/>
+                        <a14:foregroundMark x1="63414" y1="43459" x2="55659" y2="48265"/>
+                        <a14:foregroundMark x1="64146" y1="45021" x2="62830" y2="46337"/>
+                        <a14:foregroundMark x1="64840" y1="41320" x2="47508" y2="46292"/>
+                        <a14:foregroundMark x1="65029" y1="50884" x2="63333" y2="55278"/>
+                        <a14:foregroundMark x1="61522" y1="86384" x2="67510" y2="80163"/>
+                        <a14:foregroundMark x1="52500" y1="36111" x2="49722" y2="31944"/>
+                        <a14:foregroundMark x1="55556" y1="33056" x2="43056" y2="32778"/>
+                        <a14:foregroundMark x1="41944" y1="15833" x2="46389" y2="20833"/>
+                        <a14:foregroundMark x1="43611" y1="11944" x2="59167" y2="12500"/>
+                        <a14:foregroundMark x1="67222" y1="18889" x2="67469" y2="38855"/>
+                        <a14:foregroundMark x1="38611" y1="47500" x2="29167" y2="52778"/>
+                        <a14:foregroundMark x1="33133" y1="56389" x2="33611" y2="70278"/>
+                        <a14:foregroundMark x1="33105" y1="55556" x2="33133" y2="56389"/>
+                        <a14:foregroundMark x1="33094" y1="55248" x2="33105" y2="55556"/>
+                        <a14:foregroundMark x1="36667" y1="67778" x2="38611" y2="63333"/>
+                        <a14:foregroundMark x1="38611" y1="65278" x2="57500" y2="55000"/>
+                        <a14:foregroundMark x1="39722" y1="61667" x2="36389" y2="67500"/>
+                        <a14:foregroundMark x1="55833" y1="73056" x2="63889" y2="75000"/>
+                        <a14:foregroundMark x1="46667" y1="68056" x2="50618" y2="69444"/>
+                        <a14:foregroundMark x1="53333" y1="53056" x2="67500" y2="52222"/>
+                        <a14:foregroundMark x1="71074" y1="40975" x2="71111" y2="40556"/>
+                        <a14:foregroundMark x1="70278" y1="50000" x2="70393" y2="48694"/>
+                        <a14:foregroundMark x1="72222" y1="41111" x2="71944" y2="40278"/>
+                        <a14:foregroundMark x1="72445" y1="41781" x2="72222" y2="41111"/>
+                        <a14:foregroundMark x1="74444" y1="47778" x2="73587" y2="45206"/>
+                        <a14:foregroundMark x1="68156" y1="47379" x2="67222" y2="48611"/>
+                        <a14:foregroundMark x1="72904" y1="41111" x2="72411" y2="41761"/>
+                        <a14:foregroundMark x1="74167" y1="39444" x2="72904" y2="41111"/>
+                        <a14:foregroundMark x1="72778" y1="31944" x2="80000" y2="33333"/>
+                        <a14:foregroundMark x1="33333" y1="55000" x2="33333" y2="55000"/>
+                        <a14:foregroundMark x1="33333" y1="55556" x2="33333" y2="55556"/>
+                        <a14:foregroundMark x1="33889" y1="55556" x2="32785" y2="55924"/>
+                        <a14:foregroundMark x1="50278" y1="69167" x2="51471" y2="69316"/>
+                        <a14:backgroundMark x1="13611" y1="8056" x2="15000" y2="12500"/>
+                        <a14:backgroundMark x1="20833" y1="8333" x2="15833" y2="24444"/>
+                        <a14:backgroundMark x1="26111" y1="8889" x2="25278" y2="26389"/>
+                        <a14:backgroundMark x1="20556" y1="1667" x2="83333" y2="1111"/>
+                        <a14:backgroundMark x1="83333" y1="1111" x2="98056" y2="1667"/>
+                        <a14:backgroundMark x1="96667" y1="5000" x2="9167" y2="5278"/>
+                        <a14:backgroundMark x1="278" y1="833" x2="1111" y2="48333"/>
+                        <a14:backgroundMark x1="1111" y1="48333" x2="1667" y2="49722"/>
+                        <a14:backgroundMark x1="556" y1="833" x2="16389" y2="14444"/>
+                        <a14:backgroundMark x1="10000" y1="10000" x2="3333" y2="16667"/>
+                        <a14:backgroundMark x1="33611" y1="11389" x2="33611" y2="11389"/>
+                        <a14:backgroundMark x1="39167" y1="10000" x2="39167" y2="10000"/>
+                        <a14:backgroundMark x1="33889" y1="9444" x2="29167" y2="11111"/>
+                        <a14:backgroundMark x1="40556" y1="8889" x2="29444" y2="14167"/>
+                        <a14:backgroundMark x1="35833" y1="9722" x2="30278" y2="16111"/>
+                        <a14:backgroundMark x1="30278" y1="16667" x2="29722" y2="26944"/>
+                        <a14:backgroundMark x1="21389" y1="29722" x2="41510" y2="30314"/>
+                        <a14:backgroundMark x1="28611" y1="15000" x2="31389" y2="18611"/>
+                        <a14:backgroundMark x1="278" y1="28889" x2="2500" y2="99444"/>
+                        <a14:backgroundMark x1="10000" y1="99722" x2="53056" y2="98611"/>
+                        <a14:backgroundMark x1="69444" y1="95278" x2="49444" y2="97222"/>
+                        <a14:backgroundMark x1="66667" y1="91389" x2="48889" y2="93056"/>
+                        <a14:backgroundMark x1="63056" y1="88056" x2="56667" y2="91389"/>
+                        <a14:backgroundMark x1="69722" y1="73333" x2="73889" y2="83056"/>
+                        <a14:backgroundMark x1="63056" y1="77500" x2="63056" y2="79167"/>
+                        <a14:backgroundMark x1="60183" y1="78569" x2="60000" y2="78889"/>
+                        <a14:backgroundMark x1="82500" y1="70000" x2="60884" y2="69810"/>
+                        <a14:backgroundMark x1="64029" y1="48545" x2="65574" y2="47542"/>
+                        <a14:backgroundMark x1="68678" y1="18871" x2="68889" y2="12500"/>
+                        <a14:backgroundMark x1="55038" y1="50278" x2="41229" y2="50278"/>
+                        <a14:backgroundMark x1="30687" y1="70379" x2="30556" y2="71111"/>
+                        <a14:backgroundMark x1="69722" y1="10000" x2="74718" y2="29266"/>
+                        <a14:backgroundMark x1="82565" y1="29791" x2="92778" y2="40556"/>
+                        <a14:backgroundMark x1="72222" y1="18889" x2="82189" y2="29395"/>
+                        <a14:backgroundMark x1="89444" y1="35278" x2="92222" y2="68889"/>
+                        <a14:backgroundMark x1="95556" y1="41667" x2="98056" y2="92222"/>
+                        <a14:backgroundMark x1="98333" y1="80000" x2="98056" y2="98056"/>
+                        <a14:backgroundMark x1="96944" y1="90833" x2="64444" y2="95278"/>
+                        <a14:backgroundMark x1="44390" y1="10748" x2="33611" y2="10556"/>
+                        <a14:backgroundMark x1="64722" y1="11111" x2="60125" y2="11029"/>
+                        <a14:backgroundMark x1="59830" y1="11482" x2="75833" y2="13889"/>
+                        <a14:backgroundMark x1="44444" y1="9167" x2="45333" y2="9301"/>
+                        <a14:backgroundMark x1="37500" y1="20000" x2="39569" y2="20239"/>
+                        <a14:backgroundMark x1="55272" y1="49896" x2="47778" y2="50833"/>
+                        <a14:backgroundMark x1="70278" y1="41111" x2="70278" y2="41111"/>
+                        <a14:backgroundMark x1="70833" y1="40833" x2="66944" y2="46667"/>
+                        <a14:backgroundMark x1="56111" y1="70000" x2="51944" y2="70556"/>
+                        <a14:backgroundMark x1="32778" y1="55000" x2="32778" y2="55000"/>
+                        <a14:backgroundMark x1="32222" y1="56389" x2="32222" y2="56389"/>
+                        <a14:backgroundMark x1="31389" y1="56111" x2="33333" y2="54722"/>
+                        <a14:backgroundMark x1="32500" y1="55556" x2="32500" y2="55556"/>
+                        <a14:backgroundMark x1="51111" y1="69444" x2="51111" y2="69444"/>
+                        <a14:backgroundMark x1="51389" y1="69444" x2="52778" y2="69444"/>
+                      </a14:backgroundRemoval>
+                    </a14:imgEffect>
+                  </a14:imgLayer>
+                </a14:imgProps>
+              </a:ext>
+            </a:extLst>
+          </a:blip>
+          <a:stretch>
+            <a:fillRect/>
+          </a:stretch>
+        </p:blipFill>
+        <p:spPr>
+          <a:xfrm>
+            <a:off x="11086306" y="0"/>
+            <a:ext cx="1143000" cy="1143000"/>
+          </a:xfrm>
+          <a:prstGeom prst="rect">
+            <a:avLst/>
+          </a:prstGeom>
+        </p:spPr>
+      </p:pic>
+    </p:spTree>
+    <p:extLst>
+      <p:ext uri="{BB962C8B-B14F-4D97-AF65-F5344CB8AC3E}">
+        <p14:creationId xmlns:p14="http://schemas.microsoft.com/office/powerpoint/2010/main" val="1503459680"/>
+      </p:ext>
+    </p:extLst>
+  </p:cSld>
+  <p:clrMapOvr>
+    <a:masterClrMapping/>
+  </p:clrMapOvr>
+</p:sld>
+</file>
+
+<file path=ppt/slides/slide7.xml><?xml version="1.0" encoding="utf-8"?>
 <p:sld xmlns:a="http://schemas.openxmlformats.org/drawingml/2006/main" xmlns:r="http://schemas.openxmlformats.org/officeDocument/2006/relationships" xmlns:p="http://schemas.openxmlformats.org/presentationml/2006/main">
   <p:cSld>
     <p:spTree>
@@ -10380,7 +10610,7 @@
 </p:sld>
 </file>
 
-<file path=ppt/slides/slide5.xml><?xml version="1.0" encoding="utf-8"?>
+<file path=ppt/slides/slide8.xml><?xml version="1.0" encoding="utf-8"?>
 <p:sld xmlns:a="http://schemas.openxmlformats.org/drawingml/2006/main" xmlns:r="http://schemas.openxmlformats.org/officeDocument/2006/relationships" xmlns:p="http://schemas.openxmlformats.org/presentationml/2006/main">
   <p:cSld>
     <p:spTree>
@@ -10402,7 +10632,7 @@
           <p:cNvPr id="2" name="Title 1">
             <a:extLst>
               <a:ext uri="{FF2B5EF4-FFF2-40B4-BE49-F238E27FC236}">
-                <a16:creationId xmlns:a16="http://schemas.microsoft.com/office/drawing/2014/main" id="{9C100B46-2AC1-A670-41FB-D7F006D5638E}"/>
+                <a16:creationId xmlns:a16="http://schemas.microsoft.com/office/drawing/2014/main" id="{936D8D2F-6EEF-994B-7902-D0E09E827B6B}"/>
               </a:ext>
             </a:extLst>
           </p:cNvPr>
@@ -10418,7 +10648,10 @@
           <a:bodyPr/>
           <a:lstStyle/>
           <a:p>
-            <a:endParaRPr lang="fr-CA"/>
+            <a:r>
+              <a:rPr lang="fr-CA" dirty="0"/>
+              <a:t>Les utilisations de Python et les bibliothèques populaires (partie1)</a:t>
+            </a:r>
           </a:p>
         </p:txBody>
       </p:sp>
@@ -10427,7 +10660,7 @@
           <p:cNvPr id="3" name="Content Placeholder 2">
             <a:extLst>
               <a:ext uri="{FF2B5EF4-FFF2-40B4-BE49-F238E27FC236}">
-                <a16:creationId xmlns:a16="http://schemas.microsoft.com/office/drawing/2014/main" id="{640E4086-7236-75A7-9003-9E99647AC8F0}"/>
+                <a16:creationId xmlns:a16="http://schemas.microsoft.com/office/drawing/2014/main" id="{6C1418B3-8105-063B-13B2-98DF0F58019D}"/>
               </a:ext>
             </a:extLst>
           </p:cNvPr>
@@ -10443,7 +10676,65 @@
           <a:bodyPr/>
           <a:lstStyle/>
           <a:p>
-            <a:endParaRPr lang="fr-CA"/>
+            <a:r>
+              <a:rPr lang="fr-CA" dirty="0"/>
+              <a:t>Développement web</a:t>
+            </a:r>
+          </a:p>
+          <a:p>
+            <a:pPr lvl="1"/>
+            <a:r>
+              <a:rPr lang="fr-CA" dirty="0"/>
+              <a:t>Flask</a:t>
+            </a:r>
+          </a:p>
+          <a:p>
+            <a:pPr lvl="1"/>
+            <a:r>
+              <a:rPr lang="fr-CA" dirty="0"/>
+              <a:t>Django</a:t>
+            </a:r>
+          </a:p>
+          <a:p>
+            <a:pPr lvl="1"/>
+            <a:r>
+              <a:rPr lang="fr-CA" dirty="0" err="1"/>
+              <a:t>Pyramid</a:t>
+            </a:r>
+            <a:endParaRPr lang="fr-CA" dirty="0"/>
+          </a:p>
+          <a:p>
+            <a:pPr lvl="1"/>
+            <a:endParaRPr lang="fr-CA" dirty="0"/>
+          </a:p>
+          <a:p>
+            <a:r>
+              <a:rPr lang="fr-CA" dirty="0"/>
+              <a:t>Science des données</a:t>
+            </a:r>
+          </a:p>
+          <a:p>
+            <a:pPr lvl="1"/>
+            <a:r>
+              <a:rPr lang="fr-CA" dirty="0" err="1"/>
+              <a:t>Numpy</a:t>
+            </a:r>
+            <a:endParaRPr lang="fr-CA" dirty="0"/>
+          </a:p>
+          <a:p>
+            <a:pPr lvl="1"/>
+            <a:r>
+              <a:rPr lang="fr-CA" dirty="0"/>
+              <a:t>Pandas</a:t>
+            </a:r>
+          </a:p>
+          <a:p>
+            <a:pPr lvl="1"/>
+            <a:r>
+              <a:rPr lang="fr-CA" dirty="0" err="1"/>
+              <a:t>Matplotlib</a:t>
+            </a:r>
+            <a:endParaRPr lang="fr-CA" dirty="0"/>
           </a:p>
         </p:txBody>
       </p:sp>
@@ -10452,7 +10743,7 @@
           <p:cNvPr id="4" name="Picture 3" descr="Icon&#10;&#10;Description automatically generated">
             <a:extLst>
               <a:ext uri="{FF2B5EF4-FFF2-40B4-BE49-F238E27FC236}">
-                <a16:creationId xmlns:a16="http://schemas.microsoft.com/office/drawing/2014/main" id="{8374D577-F8A7-7A10-200D-B16B43BC59CE}"/>
+                <a16:creationId xmlns:a16="http://schemas.microsoft.com/office/drawing/2014/main" id="{586E031D-3402-A740-B6DA-BEFD3D3F075B}"/>
               </a:ext>
             </a:extLst>
           </p:cNvPr>
@@ -10587,7 +10878,7 @@
     </p:spTree>
     <p:extLst>
       <p:ext uri="{BB962C8B-B14F-4D97-AF65-F5344CB8AC3E}">
-        <p14:creationId xmlns:p14="http://schemas.microsoft.com/office/powerpoint/2010/main" val="2695953814"/>
+        <p14:creationId xmlns:p14="http://schemas.microsoft.com/office/powerpoint/2010/main" val="1775829582"/>
       </p:ext>
     </p:extLst>
   </p:cSld>
@@ -10597,7 +10888,7 @@
 </p:sld>
 </file>
 
-<file path=ppt/slides/slide6.xml><?xml version="1.0" encoding="utf-8"?>
+<file path=ppt/slides/slide9.xml><?xml version="1.0" encoding="utf-8"?>
 <p:sld xmlns:a="http://schemas.openxmlformats.org/drawingml/2006/main" xmlns:r="http://schemas.openxmlformats.org/officeDocument/2006/relationships" xmlns:p="http://schemas.openxmlformats.org/presentationml/2006/main">
   <p:cSld>
     <p:spTree>
@@ -10619,7 +10910,7 @@
           <p:cNvPr id="2" name="Title 1">
             <a:extLst>
               <a:ext uri="{FF2B5EF4-FFF2-40B4-BE49-F238E27FC236}">
-                <a16:creationId xmlns:a16="http://schemas.microsoft.com/office/drawing/2014/main" id="{3003E0D3-EF78-18FC-800C-C493415A543C}"/>
+                <a16:creationId xmlns:a16="http://schemas.microsoft.com/office/drawing/2014/main" id="{F2418D01-2D04-9BE2-814C-70AD626FEFE9}"/>
               </a:ext>
             </a:extLst>
           </p:cNvPr>
@@ -10635,7 +10926,10 @@
           <a:bodyPr/>
           <a:lstStyle/>
           <a:p>
-            <a:endParaRPr lang="fr-CA"/>
+            <a:r>
+              <a:rPr lang="fr-CA" dirty="0"/>
+              <a:t>Les utilisations de Python et les bibliothèques populaires (partie2)</a:t>
+            </a:r>
           </a:p>
         </p:txBody>
       </p:sp>
@@ -10644,7 +10938,7 @@
           <p:cNvPr id="3" name="Content Placeholder 2">
             <a:extLst>
               <a:ext uri="{FF2B5EF4-FFF2-40B4-BE49-F238E27FC236}">
-                <a16:creationId xmlns:a16="http://schemas.microsoft.com/office/drawing/2014/main" id="{F5BCD6E7-3BC6-986E-9456-BA6FEDE1E483}"/>
+                <a16:creationId xmlns:a16="http://schemas.microsoft.com/office/drawing/2014/main" id="{7CF96080-8A40-AEB3-4895-6693EF61324E}"/>
               </a:ext>
             </a:extLst>
           </p:cNvPr>
@@ -10660,7 +10954,71 @@
           <a:bodyPr/>
           <a:lstStyle/>
           <a:p>
-            <a:endParaRPr lang="fr-CA"/>
+            <a:r>
+              <a:rPr lang="fr-CA" dirty="0"/>
+              <a:t>Intelligence artificielle</a:t>
+            </a:r>
+          </a:p>
+          <a:p>
+            <a:pPr lvl="1"/>
+            <a:r>
+              <a:rPr lang="fr-CA" dirty="0" err="1"/>
+              <a:t>TensorFlow</a:t>
+            </a:r>
+            <a:endParaRPr lang="fr-CA" dirty="0"/>
+          </a:p>
+          <a:p>
+            <a:pPr lvl="1"/>
+            <a:r>
+              <a:rPr lang="fr-CA" dirty="0" err="1"/>
+              <a:t>PyTorch</a:t>
+            </a:r>
+            <a:endParaRPr lang="fr-CA" dirty="0"/>
+          </a:p>
+          <a:p>
+            <a:pPr lvl="1"/>
+            <a:r>
+              <a:rPr lang="fr-CA" dirty="0" err="1"/>
+              <a:t>Keras</a:t>
+            </a:r>
+            <a:endParaRPr lang="fr-CA" dirty="0"/>
+          </a:p>
+          <a:p>
+            <a:pPr lvl="1"/>
+            <a:endParaRPr lang="fr-CA" dirty="0"/>
+          </a:p>
+          <a:p>
+            <a:r>
+              <a:rPr lang="fr-CA" dirty="0"/>
+              <a:t>Automatisation de tâches</a:t>
+            </a:r>
+          </a:p>
+          <a:p>
+            <a:pPr lvl="1"/>
+            <a:r>
+              <a:rPr lang="fr-CA" dirty="0" err="1"/>
+              <a:t>Selenium</a:t>
+            </a:r>
+            <a:endParaRPr lang="fr-CA" dirty="0"/>
+          </a:p>
+          <a:p>
+            <a:pPr lvl="1"/>
+            <a:r>
+              <a:rPr lang="fr-CA" dirty="0" err="1"/>
+              <a:t>PyAutoGUI</a:t>
+            </a:r>
+            <a:endParaRPr lang="fr-CA" dirty="0"/>
+          </a:p>
+          <a:p>
+            <a:pPr lvl="1"/>
+            <a:r>
+              <a:rPr lang="fr-CA" dirty="0" err="1"/>
+              <a:t>Pywinauto</a:t>
+            </a:r>
+            <a:endParaRPr lang="fr-CA" dirty="0"/>
+          </a:p>
+          <a:p>
+            <a:endParaRPr lang="fr-CA" dirty="0"/>
           </a:p>
         </p:txBody>
       </p:sp>
@@ -10669,7 +11027,7 @@
           <p:cNvPr id="4" name="Picture 3" descr="Icon&#10;&#10;Description automatically generated">
             <a:extLst>
               <a:ext uri="{FF2B5EF4-FFF2-40B4-BE49-F238E27FC236}">
-                <a16:creationId xmlns:a16="http://schemas.microsoft.com/office/drawing/2014/main" id="{AD2D0FC7-7C5C-E3A9-FE3F-991B4ADF84E1}"/>
+                <a16:creationId xmlns:a16="http://schemas.microsoft.com/office/drawing/2014/main" id="{8F10C40B-BA8B-6973-3469-E9371BB8A75D}"/>
               </a:ext>
             </a:extLst>
           </p:cNvPr>
@@ -10804,658 +11162,7 @@
     </p:spTree>
     <p:extLst>
       <p:ext uri="{BB962C8B-B14F-4D97-AF65-F5344CB8AC3E}">
-        <p14:creationId xmlns:p14="http://schemas.microsoft.com/office/powerpoint/2010/main" val="211860786"/>
-      </p:ext>
-    </p:extLst>
-  </p:cSld>
-  <p:clrMapOvr>
-    <a:masterClrMapping/>
-  </p:clrMapOvr>
-</p:sld>
-</file>
-
-<file path=ppt/slides/slide7.xml><?xml version="1.0" encoding="utf-8"?>
-<p:sld xmlns:a="http://schemas.openxmlformats.org/drawingml/2006/main" xmlns:r="http://schemas.openxmlformats.org/officeDocument/2006/relationships" xmlns:p="http://schemas.openxmlformats.org/presentationml/2006/main">
-  <p:cSld>
-    <p:spTree>
-      <p:nvGrpSpPr>
-        <p:cNvPr id="1" name=""/>
-        <p:cNvGrpSpPr/>
-        <p:nvPr/>
-      </p:nvGrpSpPr>
-      <p:grpSpPr>
-        <a:xfrm>
-          <a:off x="0" y="0"/>
-          <a:ext cx="0" cy="0"/>
-          <a:chOff x="0" y="0"/>
-          <a:chExt cx="0" cy="0"/>
-        </a:xfrm>
-      </p:grpSpPr>
-      <p:sp>
-        <p:nvSpPr>
-          <p:cNvPr id="2" name="Title 1">
-            <a:extLst>
-              <a:ext uri="{FF2B5EF4-FFF2-40B4-BE49-F238E27FC236}">
-                <a16:creationId xmlns:a16="http://schemas.microsoft.com/office/drawing/2014/main" id="{A71CD50E-0925-2940-94FF-41BBA03442F7}"/>
-              </a:ext>
-            </a:extLst>
-          </p:cNvPr>
-          <p:cNvSpPr>
-            <a:spLocks noGrp="1"/>
-          </p:cNvSpPr>
-          <p:nvPr>
-            <p:ph type="title"/>
-          </p:nvPr>
-        </p:nvSpPr>
-        <p:spPr/>
-        <p:txBody>
-          <a:bodyPr/>
-          <a:lstStyle/>
-          <a:p>
-            <a:endParaRPr lang="fr-CA"/>
-          </a:p>
-        </p:txBody>
-      </p:sp>
-      <p:sp>
-        <p:nvSpPr>
-          <p:cNvPr id="3" name="Content Placeholder 2">
-            <a:extLst>
-              <a:ext uri="{FF2B5EF4-FFF2-40B4-BE49-F238E27FC236}">
-                <a16:creationId xmlns:a16="http://schemas.microsoft.com/office/drawing/2014/main" id="{1AFDCB7F-C0BD-63F9-E73C-BA72EBA695B3}"/>
-              </a:ext>
-            </a:extLst>
-          </p:cNvPr>
-          <p:cNvSpPr>
-            <a:spLocks noGrp="1"/>
-          </p:cNvSpPr>
-          <p:nvPr>
-            <p:ph idx="1"/>
-          </p:nvPr>
-        </p:nvSpPr>
-        <p:spPr/>
-        <p:txBody>
-          <a:bodyPr/>
-          <a:lstStyle/>
-          <a:p>
-            <a:endParaRPr lang="fr-CA"/>
-          </a:p>
-        </p:txBody>
-      </p:sp>
-      <p:pic>
-        <p:nvPicPr>
-          <p:cNvPr id="4" name="Picture 3" descr="Icon&#10;&#10;Description automatically generated">
-            <a:extLst>
-              <a:ext uri="{FF2B5EF4-FFF2-40B4-BE49-F238E27FC236}">
-                <a16:creationId xmlns:a16="http://schemas.microsoft.com/office/drawing/2014/main" id="{7A103526-4814-D43F-B50B-2FFDC31FED2C}"/>
-              </a:ext>
-            </a:extLst>
-          </p:cNvPr>
-          <p:cNvPicPr>
-            <a:picLocks noChangeAspect="1"/>
-          </p:cNvPicPr>
-          <p:nvPr/>
-        </p:nvPicPr>
-        <p:blipFill>
-          <a:blip r:embed="rId2">
-            <a:extLst>
-              <a:ext uri="{BEBA8EAE-BF5A-486C-A8C5-ECC9F3942E4B}">
-                <a14:imgProps xmlns:a14="http://schemas.microsoft.com/office/drawing/2010/main">
-                  <a14:imgLayer r:embed="rId3">
-                    <a14:imgEffect>
-                      <a14:backgroundRemoval t="0" b="98889" l="0" r="95833">
-                        <a14:foregroundMark x1="45839" y1="21123" x2="65864" y2="34817"/>
-                        <a14:foregroundMark x1="37451" y1="15387" x2="38997" y2="16444"/>
-                        <a14:foregroundMark x1="65773" y1="33981" x2="65556" y2="38056"/>
-                        <a14:foregroundMark x1="66672" y1="17060" x2="66005" y2="29601"/>
-                        <a14:foregroundMark x1="65970" y1="35791" x2="48219" y2="46292"/>
-                        <a14:foregroundMark x1="43975" y1="34426" x2="11944" y2="52500"/>
-                        <a14:foregroundMark x1="11944" y1="52500" x2="26713" y2="65767"/>
-                        <a14:foregroundMark x1="45981" y1="54263" x2="37423" y2="59567"/>
-                        <a14:foregroundMark x1="63414" y1="43459" x2="55659" y2="48265"/>
-                        <a14:foregroundMark x1="64146" y1="45021" x2="62830" y2="46337"/>
-                        <a14:foregroundMark x1="64840" y1="41320" x2="47508" y2="46292"/>
-                        <a14:foregroundMark x1="65029" y1="50884" x2="63333" y2="55278"/>
-                        <a14:foregroundMark x1="61522" y1="86384" x2="67510" y2="80163"/>
-                        <a14:foregroundMark x1="52500" y1="36111" x2="49722" y2="31944"/>
-                        <a14:foregroundMark x1="55556" y1="33056" x2="43056" y2="32778"/>
-                        <a14:foregroundMark x1="41944" y1="15833" x2="46389" y2="20833"/>
-                        <a14:foregroundMark x1="43611" y1="11944" x2="59167" y2="12500"/>
-                        <a14:foregroundMark x1="67222" y1="18889" x2="67469" y2="38855"/>
-                        <a14:foregroundMark x1="38611" y1="47500" x2="29167" y2="52778"/>
-                        <a14:foregroundMark x1="33133" y1="56389" x2="33611" y2="70278"/>
-                        <a14:foregroundMark x1="33105" y1="55556" x2="33133" y2="56389"/>
-                        <a14:foregroundMark x1="33094" y1="55248" x2="33105" y2="55556"/>
-                        <a14:foregroundMark x1="36667" y1="67778" x2="38611" y2="63333"/>
-                        <a14:foregroundMark x1="38611" y1="65278" x2="57500" y2="55000"/>
-                        <a14:foregroundMark x1="39722" y1="61667" x2="36389" y2="67500"/>
-                        <a14:foregroundMark x1="55833" y1="73056" x2="63889" y2="75000"/>
-                        <a14:foregroundMark x1="46667" y1="68056" x2="50618" y2="69444"/>
-                        <a14:foregroundMark x1="53333" y1="53056" x2="67500" y2="52222"/>
-                        <a14:foregroundMark x1="71074" y1="40975" x2="71111" y2="40556"/>
-                        <a14:foregroundMark x1="70278" y1="50000" x2="70393" y2="48694"/>
-                        <a14:foregroundMark x1="72222" y1="41111" x2="71944" y2="40278"/>
-                        <a14:foregroundMark x1="72445" y1="41781" x2="72222" y2="41111"/>
-                        <a14:foregroundMark x1="74444" y1="47778" x2="73587" y2="45206"/>
-                        <a14:foregroundMark x1="68156" y1="47379" x2="67222" y2="48611"/>
-                        <a14:foregroundMark x1="72904" y1="41111" x2="72411" y2="41761"/>
-                        <a14:foregroundMark x1="74167" y1="39444" x2="72904" y2="41111"/>
-                        <a14:foregroundMark x1="72778" y1="31944" x2="80000" y2="33333"/>
-                        <a14:foregroundMark x1="33333" y1="55000" x2="33333" y2="55000"/>
-                        <a14:foregroundMark x1="33333" y1="55556" x2="33333" y2="55556"/>
-                        <a14:foregroundMark x1="33889" y1="55556" x2="32785" y2="55924"/>
-                        <a14:foregroundMark x1="50278" y1="69167" x2="51471" y2="69316"/>
-                        <a14:backgroundMark x1="13611" y1="8056" x2="15000" y2="12500"/>
-                        <a14:backgroundMark x1="20833" y1="8333" x2="15833" y2="24444"/>
-                        <a14:backgroundMark x1="26111" y1="8889" x2="25278" y2="26389"/>
-                        <a14:backgroundMark x1="20556" y1="1667" x2="83333" y2="1111"/>
-                        <a14:backgroundMark x1="83333" y1="1111" x2="98056" y2="1667"/>
-                        <a14:backgroundMark x1="96667" y1="5000" x2="9167" y2="5278"/>
-                        <a14:backgroundMark x1="278" y1="833" x2="1111" y2="48333"/>
-                        <a14:backgroundMark x1="1111" y1="48333" x2="1667" y2="49722"/>
-                        <a14:backgroundMark x1="556" y1="833" x2="16389" y2="14444"/>
-                        <a14:backgroundMark x1="10000" y1="10000" x2="3333" y2="16667"/>
-                        <a14:backgroundMark x1="33611" y1="11389" x2="33611" y2="11389"/>
-                        <a14:backgroundMark x1="39167" y1="10000" x2="39167" y2="10000"/>
-                        <a14:backgroundMark x1="33889" y1="9444" x2="29167" y2="11111"/>
-                        <a14:backgroundMark x1="40556" y1="8889" x2="29444" y2="14167"/>
-                        <a14:backgroundMark x1="35833" y1="9722" x2="30278" y2="16111"/>
-                        <a14:backgroundMark x1="30278" y1="16667" x2="29722" y2="26944"/>
-                        <a14:backgroundMark x1="21389" y1="29722" x2="41510" y2="30314"/>
-                        <a14:backgroundMark x1="28611" y1="15000" x2="31389" y2="18611"/>
-                        <a14:backgroundMark x1="278" y1="28889" x2="2500" y2="99444"/>
-                        <a14:backgroundMark x1="10000" y1="99722" x2="53056" y2="98611"/>
-                        <a14:backgroundMark x1="69444" y1="95278" x2="49444" y2="97222"/>
-                        <a14:backgroundMark x1="66667" y1="91389" x2="48889" y2="93056"/>
-                        <a14:backgroundMark x1="63056" y1="88056" x2="56667" y2="91389"/>
-                        <a14:backgroundMark x1="69722" y1="73333" x2="73889" y2="83056"/>
-                        <a14:backgroundMark x1="63056" y1="77500" x2="63056" y2="79167"/>
-                        <a14:backgroundMark x1="60183" y1="78569" x2="60000" y2="78889"/>
-                        <a14:backgroundMark x1="82500" y1="70000" x2="60884" y2="69810"/>
-                        <a14:backgroundMark x1="64029" y1="48545" x2="65574" y2="47542"/>
-                        <a14:backgroundMark x1="68678" y1="18871" x2="68889" y2="12500"/>
-                        <a14:backgroundMark x1="55038" y1="50278" x2="41229" y2="50278"/>
-                        <a14:backgroundMark x1="30687" y1="70379" x2="30556" y2="71111"/>
-                        <a14:backgroundMark x1="69722" y1="10000" x2="74718" y2="29266"/>
-                        <a14:backgroundMark x1="82565" y1="29791" x2="92778" y2="40556"/>
-                        <a14:backgroundMark x1="72222" y1="18889" x2="82189" y2="29395"/>
-                        <a14:backgroundMark x1="89444" y1="35278" x2="92222" y2="68889"/>
-                        <a14:backgroundMark x1="95556" y1="41667" x2="98056" y2="92222"/>
-                        <a14:backgroundMark x1="98333" y1="80000" x2="98056" y2="98056"/>
-                        <a14:backgroundMark x1="96944" y1="90833" x2="64444" y2="95278"/>
-                        <a14:backgroundMark x1="44390" y1="10748" x2="33611" y2="10556"/>
-                        <a14:backgroundMark x1="64722" y1="11111" x2="60125" y2="11029"/>
-                        <a14:backgroundMark x1="59830" y1="11482" x2="75833" y2="13889"/>
-                        <a14:backgroundMark x1="44444" y1="9167" x2="45333" y2="9301"/>
-                        <a14:backgroundMark x1="37500" y1="20000" x2="39569" y2="20239"/>
-                        <a14:backgroundMark x1="55272" y1="49896" x2="47778" y2="50833"/>
-                        <a14:backgroundMark x1="70278" y1="41111" x2="70278" y2="41111"/>
-                        <a14:backgroundMark x1="70833" y1="40833" x2="66944" y2="46667"/>
-                        <a14:backgroundMark x1="56111" y1="70000" x2="51944" y2="70556"/>
-                        <a14:backgroundMark x1="32778" y1="55000" x2="32778" y2="55000"/>
-                        <a14:backgroundMark x1="32222" y1="56389" x2="32222" y2="56389"/>
-                        <a14:backgroundMark x1="31389" y1="56111" x2="33333" y2="54722"/>
-                        <a14:backgroundMark x1="32500" y1="55556" x2="32500" y2="55556"/>
-                        <a14:backgroundMark x1="51111" y1="69444" x2="51111" y2="69444"/>
-                        <a14:backgroundMark x1="51389" y1="69444" x2="52778" y2="69444"/>
-                      </a14:backgroundRemoval>
-                    </a14:imgEffect>
-                  </a14:imgLayer>
-                </a14:imgProps>
-              </a:ext>
-            </a:extLst>
-          </a:blip>
-          <a:stretch>
-            <a:fillRect/>
-          </a:stretch>
-        </p:blipFill>
-        <p:spPr>
-          <a:xfrm>
-            <a:off x="11086306" y="0"/>
-            <a:ext cx="1143000" cy="1143000"/>
-          </a:xfrm>
-          <a:prstGeom prst="rect">
-            <a:avLst/>
-          </a:prstGeom>
-        </p:spPr>
-      </p:pic>
-    </p:spTree>
-    <p:extLst>
-      <p:ext uri="{BB962C8B-B14F-4D97-AF65-F5344CB8AC3E}">
-        <p14:creationId xmlns:p14="http://schemas.microsoft.com/office/powerpoint/2010/main" val="507149908"/>
-      </p:ext>
-    </p:extLst>
-  </p:cSld>
-  <p:clrMapOvr>
-    <a:masterClrMapping/>
-  </p:clrMapOvr>
-</p:sld>
-</file>
-
-<file path=ppt/slides/slide8.xml><?xml version="1.0" encoding="utf-8"?>
-<p:sld xmlns:a="http://schemas.openxmlformats.org/drawingml/2006/main" xmlns:r="http://schemas.openxmlformats.org/officeDocument/2006/relationships" xmlns:p="http://schemas.openxmlformats.org/presentationml/2006/main">
-  <p:cSld>
-    <p:spTree>
-      <p:nvGrpSpPr>
-        <p:cNvPr id="1" name=""/>
-        <p:cNvGrpSpPr/>
-        <p:nvPr/>
-      </p:nvGrpSpPr>
-      <p:grpSpPr>
-        <a:xfrm>
-          <a:off x="0" y="0"/>
-          <a:ext cx="0" cy="0"/>
-          <a:chOff x="0" y="0"/>
-          <a:chExt cx="0" cy="0"/>
-        </a:xfrm>
-      </p:grpSpPr>
-      <p:sp>
-        <p:nvSpPr>
-          <p:cNvPr id="2" name="Title 1">
-            <a:extLst>
-              <a:ext uri="{FF2B5EF4-FFF2-40B4-BE49-F238E27FC236}">
-                <a16:creationId xmlns:a16="http://schemas.microsoft.com/office/drawing/2014/main" id="{A71CD50E-0925-2940-94FF-41BBA03442F7}"/>
-              </a:ext>
-            </a:extLst>
-          </p:cNvPr>
-          <p:cNvSpPr>
-            <a:spLocks noGrp="1"/>
-          </p:cNvSpPr>
-          <p:nvPr>
-            <p:ph type="title"/>
-          </p:nvPr>
-        </p:nvSpPr>
-        <p:spPr/>
-        <p:txBody>
-          <a:bodyPr/>
-          <a:lstStyle/>
-          <a:p>
-            <a:endParaRPr lang="fr-CA"/>
-          </a:p>
-        </p:txBody>
-      </p:sp>
-      <p:sp>
-        <p:nvSpPr>
-          <p:cNvPr id="3" name="Content Placeholder 2">
-            <a:extLst>
-              <a:ext uri="{FF2B5EF4-FFF2-40B4-BE49-F238E27FC236}">
-                <a16:creationId xmlns:a16="http://schemas.microsoft.com/office/drawing/2014/main" id="{1AFDCB7F-C0BD-63F9-E73C-BA72EBA695B3}"/>
-              </a:ext>
-            </a:extLst>
-          </p:cNvPr>
-          <p:cNvSpPr>
-            <a:spLocks noGrp="1"/>
-          </p:cNvSpPr>
-          <p:nvPr>
-            <p:ph idx="1"/>
-          </p:nvPr>
-        </p:nvSpPr>
-        <p:spPr/>
-        <p:txBody>
-          <a:bodyPr/>
-          <a:lstStyle/>
-          <a:p>
-            <a:endParaRPr lang="fr-CA"/>
-          </a:p>
-        </p:txBody>
-      </p:sp>
-      <p:pic>
-        <p:nvPicPr>
-          <p:cNvPr id="4" name="Picture 3" descr="Icon&#10;&#10;Description automatically generated">
-            <a:extLst>
-              <a:ext uri="{FF2B5EF4-FFF2-40B4-BE49-F238E27FC236}">
-                <a16:creationId xmlns:a16="http://schemas.microsoft.com/office/drawing/2014/main" id="{7A103526-4814-D43F-B50B-2FFDC31FED2C}"/>
-              </a:ext>
-            </a:extLst>
-          </p:cNvPr>
-          <p:cNvPicPr>
-            <a:picLocks noChangeAspect="1"/>
-          </p:cNvPicPr>
-          <p:nvPr/>
-        </p:nvPicPr>
-        <p:blipFill>
-          <a:blip r:embed="rId2">
-            <a:extLst>
-              <a:ext uri="{BEBA8EAE-BF5A-486C-A8C5-ECC9F3942E4B}">
-                <a14:imgProps xmlns:a14="http://schemas.microsoft.com/office/drawing/2010/main">
-                  <a14:imgLayer r:embed="rId3">
-                    <a14:imgEffect>
-                      <a14:backgroundRemoval t="0" b="98889" l="0" r="95833">
-                        <a14:foregroundMark x1="45839" y1="21123" x2="65864" y2="34817"/>
-                        <a14:foregroundMark x1="37451" y1="15387" x2="38997" y2="16444"/>
-                        <a14:foregroundMark x1="65773" y1="33981" x2="65556" y2="38056"/>
-                        <a14:foregroundMark x1="66672" y1="17060" x2="66005" y2="29601"/>
-                        <a14:foregroundMark x1="65970" y1="35791" x2="48219" y2="46292"/>
-                        <a14:foregroundMark x1="43975" y1="34426" x2="11944" y2="52500"/>
-                        <a14:foregroundMark x1="11944" y1="52500" x2="26713" y2="65767"/>
-                        <a14:foregroundMark x1="45981" y1="54263" x2="37423" y2="59567"/>
-                        <a14:foregroundMark x1="63414" y1="43459" x2="55659" y2="48265"/>
-                        <a14:foregroundMark x1="64146" y1="45021" x2="62830" y2="46337"/>
-                        <a14:foregroundMark x1="64840" y1="41320" x2="47508" y2="46292"/>
-                        <a14:foregroundMark x1="65029" y1="50884" x2="63333" y2="55278"/>
-                        <a14:foregroundMark x1="61522" y1="86384" x2="67510" y2="80163"/>
-                        <a14:foregroundMark x1="52500" y1="36111" x2="49722" y2="31944"/>
-                        <a14:foregroundMark x1="55556" y1="33056" x2="43056" y2="32778"/>
-                        <a14:foregroundMark x1="41944" y1="15833" x2="46389" y2="20833"/>
-                        <a14:foregroundMark x1="43611" y1="11944" x2="59167" y2="12500"/>
-                        <a14:foregroundMark x1="67222" y1="18889" x2="67469" y2="38855"/>
-                        <a14:foregroundMark x1="38611" y1="47500" x2="29167" y2="52778"/>
-                        <a14:foregroundMark x1="33133" y1="56389" x2="33611" y2="70278"/>
-                        <a14:foregroundMark x1="33105" y1="55556" x2="33133" y2="56389"/>
-                        <a14:foregroundMark x1="33094" y1="55248" x2="33105" y2="55556"/>
-                        <a14:foregroundMark x1="36667" y1="67778" x2="38611" y2="63333"/>
-                        <a14:foregroundMark x1="38611" y1="65278" x2="57500" y2="55000"/>
-                        <a14:foregroundMark x1="39722" y1="61667" x2="36389" y2="67500"/>
-                        <a14:foregroundMark x1="55833" y1="73056" x2="63889" y2="75000"/>
-                        <a14:foregroundMark x1="46667" y1="68056" x2="50618" y2="69444"/>
-                        <a14:foregroundMark x1="53333" y1="53056" x2="67500" y2="52222"/>
-                        <a14:foregroundMark x1="71074" y1="40975" x2="71111" y2="40556"/>
-                        <a14:foregroundMark x1="70278" y1="50000" x2="70393" y2="48694"/>
-                        <a14:foregroundMark x1="72222" y1="41111" x2="71944" y2="40278"/>
-                        <a14:foregroundMark x1="72445" y1="41781" x2="72222" y2="41111"/>
-                        <a14:foregroundMark x1="74444" y1="47778" x2="73587" y2="45206"/>
-                        <a14:foregroundMark x1="68156" y1="47379" x2="67222" y2="48611"/>
-                        <a14:foregroundMark x1="72904" y1="41111" x2="72411" y2="41761"/>
-                        <a14:foregroundMark x1="74167" y1="39444" x2="72904" y2="41111"/>
-                        <a14:foregroundMark x1="72778" y1="31944" x2="80000" y2="33333"/>
-                        <a14:foregroundMark x1="33333" y1="55000" x2="33333" y2="55000"/>
-                        <a14:foregroundMark x1="33333" y1="55556" x2="33333" y2="55556"/>
-                        <a14:foregroundMark x1="33889" y1="55556" x2="32785" y2="55924"/>
-                        <a14:foregroundMark x1="50278" y1="69167" x2="51471" y2="69316"/>
-                        <a14:backgroundMark x1="13611" y1="8056" x2="15000" y2="12500"/>
-                        <a14:backgroundMark x1="20833" y1="8333" x2="15833" y2="24444"/>
-                        <a14:backgroundMark x1="26111" y1="8889" x2="25278" y2="26389"/>
-                        <a14:backgroundMark x1="20556" y1="1667" x2="83333" y2="1111"/>
-                        <a14:backgroundMark x1="83333" y1="1111" x2="98056" y2="1667"/>
-                        <a14:backgroundMark x1="96667" y1="5000" x2="9167" y2="5278"/>
-                        <a14:backgroundMark x1="278" y1="833" x2="1111" y2="48333"/>
-                        <a14:backgroundMark x1="1111" y1="48333" x2="1667" y2="49722"/>
-                        <a14:backgroundMark x1="556" y1="833" x2="16389" y2="14444"/>
-                        <a14:backgroundMark x1="10000" y1="10000" x2="3333" y2="16667"/>
-                        <a14:backgroundMark x1="33611" y1="11389" x2="33611" y2="11389"/>
-                        <a14:backgroundMark x1="39167" y1="10000" x2="39167" y2="10000"/>
-                        <a14:backgroundMark x1="33889" y1="9444" x2="29167" y2="11111"/>
-                        <a14:backgroundMark x1="40556" y1="8889" x2="29444" y2="14167"/>
-                        <a14:backgroundMark x1="35833" y1="9722" x2="30278" y2="16111"/>
-                        <a14:backgroundMark x1="30278" y1="16667" x2="29722" y2="26944"/>
-                        <a14:backgroundMark x1="21389" y1="29722" x2="41510" y2="30314"/>
-                        <a14:backgroundMark x1="28611" y1="15000" x2="31389" y2="18611"/>
-                        <a14:backgroundMark x1="278" y1="28889" x2="2500" y2="99444"/>
-                        <a14:backgroundMark x1="10000" y1="99722" x2="53056" y2="98611"/>
-                        <a14:backgroundMark x1="69444" y1="95278" x2="49444" y2="97222"/>
-                        <a14:backgroundMark x1="66667" y1="91389" x2="48889" y2="93056"/>
-                        <a14:backgroundMark x1="63056" y1="88056" x2="56667" y2="91389"/>
-                        <a14:backgroundMark x1="69722" y1="73333" x2="73889" y2="83056"/>
-                        <a14:backgroundMark x1="63056" y1="77500" x2="63056" y2="79167"/>
-                        <a14:backgroundMark x1="60183" y1="78569" x2="60000" y2="78889"/>
-                        <a14:backgroundMark x1="82500" y1="70000" x2="60884" y2="69810"/>
-                        <a14:backgroundMark x1="64029" y1="48545" x2="65574" y2="47542"/>
-                        <a14:backgroundMark x1="68678" y1="18871" x2="68889" y2="12500"/>
-                        <a14:backgroundMark x1="55038" y1="50278" x2="41229" y2="50278"/>
-                        <a14:backgroundMark x1="30687" y1="70379" x2="30556" y2="71111"/>
-                        <a14:backgroundMark x1="69722" y1="10000" x2="74718" y2="29266"/>
-                        <a14:backgroundMark x1="82565" y1="29791" x2="92778" y2="40556"/>
-                        <a14:backgroundMark x1="72222" y1="18889" x2="82189" y2="29395"/>
-                        <a14:backgroundMark x1="89444" y1="35278" x2="92222" y2="68889"/>
-                        <a14:backgroundMark x1="95556" y1="41667" x2="98056" y2="92222"/>
-                        <a14:backgroundMark x1="98333" y1="80000" x2="98056" y2="98056"/>
-                        <a14:backgroundMark x1="96944" y1="90833" x2="64444" y2="95278"/>
-                        <a14:backgroundMark x1="44390" y1="10748" x2="33611" y2="10556"/>
-                        <a14:backgroundMark x1="64722" y1="11111" x2="60125" y2="11029"/>
-                        <a14:backgroundMark x1="59830" y1="11482" x2="75833" y2="13889"/>
-                        <a14:backgroundMark x1="44444" y1="9167" x2="45333" y2="9301"/>
-                        <a14:backgroundMark x1="37500" y1="20000" x2="39569" y2="20239"/>
-                        <a14:backgroundMark x1="55272" y1="49896" x2="47778" y2="50833"/>
-                        <a14:backgroundMark x1="70278" y1="41111" x2="70278" y2="41111"/>
-                        <a14:backgroundMark x1="70833" y1="40833" x2="66944" y2="46667"/>
-                        <a14:backgroundMark x1="56111" y1="70000" x2="51944" y2="70556"/>
-                        <a14:backgroundMark x1="32778" y1="55000" x2="32778" y2="55000"/>
-                        <a14:backgroundMark x1="32222" y1="56389" x2="32222" y2="56389"/>
-                        <a14:backgroundMark x1="31389" y1="56111" x2="33333" y2="54722"/>
-                        <a14:backgroundMark x1="32500" y1="55556" x2="32500" y2="55556"/>
-                        <a14:backgroundMark x1="51111" y1="69444" x2="51111" y2="69444"/>
-                        <a14:backgroundMark x1="51389" y1="69444" x2="52778" y2="69444"/>
-                      </a14:backgroundRemoval>
-                    </a14:imgEffect>
-                  </a14:imgLayer>
-                </a14:imgProps>
-              </a:ext>
-            </a:extLst>
-          </a:blip>
-          <a:stretch>
-            <a:fillRect/>
-          </a:stretch>
-        </p:blipFill>
-        <p:spPr>
-          <a:xfrm>
-            <a:off x="11086306" y="0"/>
-            <a:ext cx="1143000" cy="1143000"/>
-          </a:xfrm>
-          <a:prstGeom prst="rect">
-            <a:avLst/>
-          </a:prstGeom>
-        </p:spPr>
-      </p:pic>
-    </p:spTree>
-    <p:extLst>
-      <p:ext uri="{BB962C8B-B14F-4D97-AF65-F5344CB8AC3E}">
-        <p14:creationId xmlns:p14="http://schemas.microsoft.com/office/powerpoint/2010/main" val="814130510"/>
-      </p:ext>
-    </p:extLst>
-  </p:cSld>
-  <p:clrMapOvr>
-    <a:masterClrMapping/>
-  </p:clrMapOvr>
-</p:sld>
-</file>
-
-<file path=ppt/slides/slide9.xml><?xml version="1.0" encoding="utf-8"?>
-<p:sld xmlns:a="http://schemas.openxmlformats.org/drawingml/2006/main" xmlns:r="http://schemas.openxmlformats.org/officeDocument/2006/relationships" xmlns:p="http://schemas.openxmlformats.org/presentationml/2006/main">
-  <p:cSld>
-    <p:spTree>
-      <p:nvGrpSpPr>
-        <p:cNvPr id="1" name=""/>
-        <p:cNvGrpSpPr/>
-        <p:nvPr/>
-      </p:nvGrpSpPr>
-      <p:grpSpPr>
-        <a:xfrm>
-          <a:off x="0" y="0"/>
-          <a:ext cx="0" cy="0"/>
-          <a:chOff x="0" y="0"/>
-          <a:chExt cx="0" cy="0"/>
-        </a:xfrm>
-      </p:grpSpPr>
-      <p:sp>
-        <p:nvSpPr>
-          <p:cNvPr id="2" name="Title 1">
-            <a:extLst>
-              <a:ext uri="{FF2B5EF4-FFF2-40B4-BE49-F238E27FC236}">
-                <a16:creationId xmlns:a16="http://schemas.microsoft.com/office/drawing/2014/main" id="{A71CD50E-0925-2940-94FF-41BBA03442F7}"/>
-              </a:ext>
-            </a:extLst>
-          </p:cNvPr>
-          <p:cNvSpPr>
-            <a:spLocks noGrp="1"/>
-          </p:cNvSpPr>
-          <p:nvPr>
-            <p:ph type="title"/>
-          </p:nvPr>
-        </p:nvSpPr>
-        <p:spPr/>
-        <p:txBody>
-          <a:bodyPr/>
-          <a:lstStyle/>
-          <a:p>
-            <a:endParaRPr lang="fr-CA"/>
-          </a:p>
-        </p:txBody>
-      </p:sp>
-      <p:sp>
-        <p:nvSpPr>
-          <p:cNvPr id="3" name="Content Placeholder 2">
-            <a:extLst>
-              <a:ext uri="{FF2B5EF4-FFF2-40B4-BE49-F238E27FC236}">
-                <a16:creationId xmlns:a16="http://schemas.microsoft.com/office/drawing/2014/main" id="{1AFDCB7F-C0BD-63F9-E73C-BA72EBA695B3}"/>
-              </a:ext>
-            </a:extLst>
-          </p:cNvPr>
-          <p:cNvSpPr>
-            <a:spLocks noGrp="1"/>
-          </p:cNvSpPr>
-          <p:nvPr>
-            <p:ph idx="1"/>
-          </p:nvPr>
-        </p:nvSpPr>
-        <p:spPr/>
-        <p:txBody>
-          <a:bodyPr/>
-          <a:lstStyle/>
-          <a:p>
-            <a:endParaRPr lang="fr-CA"/>
-          </a:p>
-        </p:txBody>
-      </p:sp>
-      <p:pic>
-        <p:nvPicPr>
-          <p:cNvPr id="4" name="Picture 3" descr="Icon&#10;&#10;Description automatically generated">
-            <a:extLst>
-              <a:ext uri="{FF2B5EF4-FFF2-40B4-BE49-F238E27FC236}">
-                <a16:creationId xmlns:a16="http://schemas.microsoft.com/office/drawing/2014/main" id="{7A103526-4814-D43F-B50B-2FFDC31FED2C}"/>
-              </a:ext>
-            </a:extLst>
-          </p:cNvPr>
-          <p:cNvPicPr>
-            <a:picLocks noChangeAspect="1"/>
-          </p:cNvPicPr>
-          <p:nvPr/>
-        </p:nvPicPr>
-        <p:blipFill>
-          <a:blip r:embed="rId2">
-            <a:extLst>
-              <a:ext uri="{BEBA8EAE-BF5A-486C-A8C5-ECC9F3942E4B}">
-                <a14:imgProps xmlns:a14="http://schemas.microsoft.com/office/drawing/2010/main">
-                  <a14:imgLayer r:embed="rId3">
-                    <a14:imgEffect>
-                      <a14:backgroundRemoval t="0" b="98889" l="0" r="95833">
-                        <a14:foregroundMark x1="45839" y1="21123" x2="65864" y2="34817"/>
-                        <a14:foregroundMark x1="37451" y1="15387" x2="38997" y2="16444"/>
-                        <a14:foregroundMark x1="65773" y1="33981" x2="65556" y2="38056"/>
-                        <a14:foregroundMark x1="66672" y1="17060" x2="66005" y2="29601"/>
-                        <a14:foregroundMark x1="65970" y1="35791" x2="48219" y2="46292"/>
-                        <a14:foregroundMark x1="43975" y1="34426" x2="11944" y2="52500"/>
-                        <a14:foregroundMark x1="11944" y1="52500" x2="26713" y2="65767"/>
-                        <a14:foregroundMark x1="45981" y1="54263" x2="37423" y2="59567"/>
-                        <a14:foregroundMark x1="63414" y1="43459" x2="55659" y2="48265"/>
-                        <a14:foregroundMark x1="64146" y1="45021" x2="62830" y2="46337"/>
-                        <a14:foregroundMark x1="64840" y1="41320" x2="47508" y2="46292"/>
-                        <a14:foregroundMark x1="65029" y1="50884" x2="63333" y2="55278"/>
-                        <a14:foregroundMark x1="61522" y1="86384" x2="67510" y2="80163"/>
-                        <a14:foregroundMark x1="52500" y1="36111" x2="49722" y2="31944"/>
-                        <a14:foregroundMark x1="55556" y1="33056" x2="43056" y2="32778"/>
-                        <a14:foregroundMark x1="41944" y1="15833" x2="46389" y2="20833"/>
-                        <a14:foregroundMark x1="43611" y1="11944" x2="59167" y2="12500"/>
-                        <a14:foregroundMark x1="67222" y1="18889" x2="67469" y2="38855"/>
-                        <a14:foregroundMark x1="38611" y1="47500" x2="29167" y2="52778"/>
-                        <a14:foregroundMark x1="33133" y1="56389" x2="33611" y2="70278"/>
-                        <a14:foregroundMark x1="33105" y1="55556" x2="33133" y2="56389"/>
-                        <a14:foregroundMark x1="33094" y1="55248" x2="33105" y2="55556"/>
-                        <a14:foregroundMark x1="36667" y1="67778" x2="38611" y2="63333"/>
-                        <a14:foregroundMark x1="38611" y1="65278" x2="57500" y2="55000"/>
-                        <a14:foregroundMark x1="39722" y1="61667" x2="36389" y2="67500"/>
-                        <a14:foregroundMark x1="55833" y1="73056" x2="63889" y2="75000"/>
-                        <a14:foregroundMark x1="46667" y1="68056" x2="50618" y2="69444"/>
-                        <a14:foregroundMark x1="53333" y1="53056" x2="67500" y2="52222"/>
-                        <a14:foregroundMark x1="71074" y1="40975" x2="71111" y2="40556"/>
-                        <a14:foregroundMark x1="70278" y1="50000" x2="70393" y2="48694"/>
-                        <a14:foregroundMark x1="72222" y1="41111" x2="71944" y2="40278"/>
-                        <a14:foregroundMark x1="72445" y1="41781" x2="72222" y2="41111"/>
-                        <a14:foregroundMark x1="74444" y1="47778" x2="73587" y2="45206"/>
-                        <a14:foregroundMark x1="68156" y1="47379" x2="67222" y2="48611"/>
-                        <a14:foregroundMark x1="72904" y1="41111" x2="72411" y2="41761"/>
-                        <a14:foregroundMark x1="74167" y1="39444" x2="72904" y2="41111"/>
-                        <a14:foregroundMark x1="72778" y1="31944" x2="80000" y2="33333"/>
-                        <a14:foregroundMark x1="33333" y1="55000" x2="33333" y2="55000"/>
-                        <a14:foregroundMark x1="33333" y1="55556" x2="33333" y2="55556"/>
-                        <a14:foregroundMark x1="33889" y1="55556" x2="32785" y2="55924"/>
-                        <a14:foregroundMark x1="50278" y1="69167" x2="51471" y2="69316"/>
-                        <a14:backgroundMark x1="13611" y1="8056" x2="15000" y2="12500"/>
-                        <a14:backgroundMark x1="20833" y1="8333" x2="15833" y2="24444"/>
-                        <a14:backgroundMark x1="26111" y1="8889" x2="25278" y2="26389"/>
-                        <a14:backgroundMark x1="20556" y1="1667" x2="83333" y2="1111"/>
-                        <a14:backgroundMark x1="83333" y1="1111" x2="98056" y2="1667"/>
-                        <a14:backgroundMark x1="96667" y1="5000" x2="9167" y2="5278"/>
-                        <a14:backgroundMark x1="278" y1="833" x2="1111" y2="48333"/>
-                        <a14:backgroundMark x1="1111" y1="48333" x2="1667" y2="49722"/>
-                        <a14:backgroundMark x1="556" y1="833" x2="16389" y2="14444"/>
-                        <a14:backgroundMark x1="10000" y1="10000" x2="3333" y2="16667"/>
-                        <a14:backgroundMark x1="33611" y1="11389" x2="33611" y2="11389"/>
-                        <a14:backgroundMark x1="39167" y1="10000" x2="39167" y2="10000"/>
-                        <a14:backgroundMark x1="33889" y1="9444" x2="29167" y2="11111"/>
-                        <a14:backgroundMark x1="40556" y1="8889" x2="29444" y2="14167"/>
-                        <a14:backgroundMark x1="35833" y1="9722" x2="30278" y2="16111"/>
-                        <a14:backgroundMark x1="30278" y1="16667" x2="29722" y2="26944"/>
-                        <a14:backgroundMark x1="21389" y1="29722" x2="41510" y2="30314"/>
-                        <a14:backgroundMark x1="28611" y1="15000" x2="31389" y2="18611"/>
-                        <a14:backgroundMark x1="278" y1="28889" x2="2500" y2="99444"/>
-                        <a14:backgroundMark x1="10000" y1="99722" x2="53056" y2="98611"/>
-                        <a14:backgroundMark x1="69444" y1="95278" x2="49444" y2="97222"/>
-                        <a14:backgroundMark x1="66667" y1="91389" x2="48889" y2="93056"/>
-                        <a14:backgroundMark x1="63056" y1="88056" x2="56667" y2="91389"/>
-                        <a14:backgroundMark x1="69722" y1="73333" x2="73889" y2="83056"/>
-                        <a14:backgroundMark x1="63056" y1="77500" x2="63056" y2="79167"/>
-                        <a14:backgroundMark x1="60183" y1="78569" x2="60000" y2="78889"/>
-                        <a14:backgroundMark x1="82500" y1="70000" x2="60884" y2="69810"/>
-                        <a14:backgroundMark x1="64029" y1="48545" x2="65574" y2="47542"/>
-                        <a14:backgroundMark x1="68678" y1="18871" x2="68889" y2="12500"/>
-                        <a14:backgroundMark x1="55038" y1="50278" x2="41229" y2="50278"/>
-                        <a14:backgroundMark x1="30687" y1="70379" x2="30556" y2="71111"/>
-                        <a14:backgroundMark x1="69722" y1="10000" x2="74718" y2="29266"/>
-                        <a14:backgroundMark x1="82565" y1="29791" x2="92778" y2="40556"/>
-                        <a14:backgroundMark x1="72222" y1="18889" x2="82189" y2="29395"/>
-                        <a14:backgroundMark x1="89444" y1="35278" x2="92222" y2="68889"/>
-                        <a14:backgroundMark x1="95556" y1="41667" x2="98056" y2="92222"/>
-                        <a14:backgroundMark x1="98333" y1="80000" x2="98056" y2="98056"/>
-                        <a14:backgroundMark x1="96944" y1="90833" x2="64444" y2="95278"/>
-                        <a14:backgroundMark x1="44390" y1="10748" x2="33611" y2="10556"/>
-                        <a14:backgroundMark x1="64722" y1="11111" x2="60125" y2="11029"/>
-                        <a14:backgroundMark x1="59830" y1="11482" x2="75833" y2="13889"/>
-                        <a14:backgroundMark x1="44444" y1="9167" x2="45333" y2="9301"/>
-                        <a14:backgroundMark x1="37500" y1="20000" x2="39569" y2="20239"/>
-                        <a14:backgroundMark x1="55272" y1="49896" x2="47778" y2="50833"/>
-                        <a14:backgroundMark x1="70278" y1="41111" x2="70278" y2="41111"/>
-                        <a14:backgroundMark x1="70833" y1="40833" x2="66944" y2="46667"/>
-                        <a14:backgroundMark x1="56111" y1="70000" x2="51944" y2="70556"/>
-                        <a14:backgroundMark x1="32778" y1="55000" x2="32778" y2="55000"/>
-                        <a14:backgroundMark x1="32222" y1="56389" x2="32222" y2="56389"/>
-                        <a14:backgroundMark x1="31389" y1="56111" x2="33333" y2="54722"/>
-                        <a14:backgroundMark x1="32500" y1="55556" x2="32500" y2="55556"/>
-                        <a14:backgroundMark x1="51111" y1="69444" x2="51111" y2="69444"/>
-                        <a14:backgroundMark x1="51389" y1="69444" x2="52778" y2="69444"/>
-                      </a14:backgroundRemoval>
-                    </a14:imgEffect>
-                  </a14:imgLayer>
-                </a14:imgProps>
-              </a:ext>
-            </a:extLst>
-          </a:blip>
-          <a:stretch>
-            <a:fillRect/>
-          </a:stretch>
-        </p:blipFill>
-        <p:spPr>
-          <a:xfrm>
-            <a:off x="11086306" y="0"/>
-            <a:ext cx="1143000" cy="1143000"/>
-          </a:xfrm>
-          <a:prstGeom prst="rect">
-            <a:avLst/>
-          </a:prstGeom>
-        </p:spPr>
-      </p:pic>
-    </p:spTree>
-    <p:extLst>
-      <p:ext uri="{BB962C8B-B14F-4D97-AF65-F5344CB8AC3E}">
-        <p14:creationId xmlns:p14="http://schemas.microsoft.com/office/powerpoint/2010/main" val="3880776498"/>
+        <p14:creationId xmlns:p14="http://schemas.microsoft.com/office/powerpoint/2010/main" val="2097261974"/>
       </p:ext>
     </p:extLst>
   </p:cSld>
@@ -12321,6 +12028,24 @@
 </file>
 
 <file path=customXml/item1.xml><?xml version="1.0" encoding="utf-8"?>
+<?mso-contentType ?>
+<FormTemplates xmlns="http://schemas.microsoft.com/sharepoint/v3/contenttype/forms">
+  <Display>DocumentLibraryForm</Display>
+  <Edit>DocumentLibraryForm</Edit>
+  <New>DocumentLibraryForm</New>
+</FormTemplates>
+</file>
+
+<file path=customXml/item2.xml><?xml version="1.0" encoding="utf-8"?>
+<p:properties xmlns:p="http://schemas.microsoft.com/office/2006/metadata/properties" xmlns:xsi="http://www.w3.org/2001/XMLSchema-instance" xmlns:pc="http://schemas.microsoft.com/office/infopath/2007/PartnerControls">
+  <documentManagement>
+    <Status xmlns="71af3243-3dd4-4a8d-8c0d-dd76da1f02a5">Not started</Status>
+    <MediaServiceKeyPoints xmlns="71af3243-3dd4-4a8d-8c0d-dd76da1f02a5" xsi:nil="true"/>
+  </documentManagement>
+</p:properties>
+</file>
+
+<file path=customXml/item3.xml><?xml version="1.0" encoding="utf-8"?>
 <ct:contentTypeSchema xmlns:ct="http://schemas.microsoft.com/office/2006/metadata/contentType" xmlns:ma="http://schemas.microsoft.com/office/2006/metadata/properties/metaAttributes" ct:_="" ma:_="" ma:contentTypeName="Document" ma:contentTypeID="0x01010079F111ED35F8CC479449609E8A0923A6" ma:contentTypeVersion="12" ma:contentTypeDescription="Create a new document." ma:contentTypeScope="" ma:versionID="93813dd7ca6ad654711aa0ab317e03a3">
   <xsd:schema xmlns:xsd="http://www.w3.org/2001/XMLSchema" xmlns:xs="http://www.w3.org/2001/XMLSchema" xmlns:p="http://schemas.microsoft.com/office/2006/metadata/properties" xmlns:ns2="71af3243-3dd4-4a8d-8c0d-dd76da1f02a5" xmlns:ns3="16c05727-aa75-4e4a-9b5f-8a80a1165891" targetNamespace="http://schemas.microsoft.com/office/2006/metadata/properties" ma:root="true" ma:fieldsID="f11dc0ce689dd3925e84e4e35398c6e7" ns2:_="" ns3:_="">
     <xsd:import namespace="71af3243-3dd4-4a8d-8c0d-dd76da1f02a5"/>
@@ -12541,25 +12266,25 @@
 </ct:contentTypeSchema>
 </file>
 
-<file path=customXml/item2.xml><?xml version="1.0" encoding="utf-8"?>
-<p:properties xmlns:p="http://schemas.microsoft.com/office/2006/metadata/properties" xmlns:xsi="http://www.w3.org/2001/XMLSchema-instance" xmlns:pc="http://schemas.microsoft.com/office/infopath/2007/PartnerControls">
-  <documentManagement>
-    <Status xmlns="71af3243-3dd4-4a8d-8c0d-dd76da1f02a5">Not started</Status>
-    <MediaServiceKeyPoints xmlns="71af3243-3dd4-4a8d-8c0d-dd76da1f02a5" xsi:nil="true"/>
-  </documentManagement>
-</p:properties>
+<file path=customXml/itemProps1.xml><?xml version="1.0" encoding="utf-8"?>
+<ds:datastoreItem xmlns:ds="http://schemas.openxmlformats.org/officeDocument/2006/customXml" ds:itemID="{0D16958A-754B-4396-9457-FD7A427A37DD}">
+  <ds:schemaRefs>
+    <ds:schemaRef ds:uri="http://schemas.microsoft.com/sharepoint/v3/contenttype/forms"/>
+  </ds:schemaRefs>
+</ds:datastoreItem>
 </file>
 
-<file path=customXml/item3.xml><?xml version="1.0" encoding="utf-8"?>
-<?mso-contentType ?>
-<FormTemplates xmlns="http://schemas.microsoft.com/sharepoint/v3/contenttype/forms">
-  <Display>DocumentLibraryForm</Display>
-  <Edit>DocumentLibraryForm</Edit>
-  <New>DocumentLibraryForm</New>
-</FormTemplates>
+<file path=customXml/itemProps2.xml><?xml version="1.0" encoding="utf-8"?>
+<ds:datastoreItem xmlns:ds="http://schemas.openxmlformats.org/officeDocument/2006/customXml" ds:itemID="{048C88F1-1664-415F-AFCE-F6CF45809817}">
+  <ds:schemaRefs>
+    <ds:schemaRef ds:uri="http://schemas.microsoft.com/office/2006/metadata/properties"/>
+    <ds:schemaRef ds:uri="http://schemas.microsoft.com/office/infopath/2007/PartnerControls"/>
+    <ds:schemaRef ds:uri="71af3243-3dd4-4a8d-8c0d-dd76da1f02a5"/>
+  </ds:schemaRefs>
+</ds:datastoreItem>
 </file>
 
-<file path=customXml/itemProps1.xml><?xml version="1.0" encoding="utf-8"?>
+<file path=customXml/itemProps3.xml><?xml version="1.0" encoding="utf-8"?>
 <ds:datastoreItem xmlns:ds="http://schemas.openxmlformats.org/officeDocument/2006/customXml" ds:itemID="{CC30393A-FEC6-4A44-9E4A-6EA49F1F7DC0}">
   <ds:schemaRefs>
     <ds:schemaRef ds:uri="http://schemas.microsoft.com/office/2006/metadata/contentType"/>
@@ -12576,22 +12301,4 @@
     <ds:schemaRef ds:uri="http://schemas.microsoft.com/internal/obd"/>
   </ds:schemaRefs>
 </ds:datastoreItem>
-</file>
-
-<file path=customXml/itemProps2.xml><?xml version="1.0" encoding="utf-8"?>
-<ds:datastoreItem xmlns:ds="http://schemas.openxmlformats.org/officeDocument/2006/customXml" ds:itemID="{048C88F1-1664-415F-AFCE-F6CF45809817}">
-  <ds:schemaRefs>
-    <ds:schemaRef ds:uri="http://schemas.microsoft.com/office/2006/metadata/properties"/>
-    <ds:schemaRef ds:uri="http://schemas.microsoft.com/office/infopath/2007/PartnerControls"/>
-    <ds:schemaRef ds:uri="71af3243-3dd4-4a8d-8c0d-dd76da1f02a5"/>
-  </ds:schemaRefs>
-</ds:datastoreItem>
-</file>
-
-<file path=customXml/itemProps3.xml><?xml version="1.0" encoding="utf-8"?>
-<ds:datastoreItem xmlns:ds="http://schemas.openxmlformats.org/officeDocument/2006/customXml" ds:itemID="{0D16958A-754B-4396-9457-FD7A427A37DD}">
-  <ds:schemaRefs>
-    <ds:schemaRef ds:uri="http://schemas.microsoft.com/sharepoint/v3/contenttype/forms"/>
-  </ds:schemaRefs>
-</ds:datastoreItem>
 </file>
</xml_diff>